<commit_message>
Adding final slide format
</commit_message>
<xml_diff>
--- a/Housing Market Presentation Draft.pptx
+++ b/Housing Market Presentation Draft.pptx
@@ -5,35 +5,34 @@
     <p:sldMasterId id="2147483648" r:id="rId1"/>
   </p:sldMasterIdLst>
   <p:notesMasterIdLst>
-    <p:notesMasterId r:id="rId25"/>
+    <p:notesMasterId r:id="rId24"/>
   </p:notesMasterIdLst>
   <p:handoutMasterIdLst>
-    <p:handoutMasterId r:id="rId26"/>
+    <p:handoutMasterId r:id="rId25"/>
   </p:handoutMasterIdLst>
   <p:sldIdLst>
     <p:sldId id="256" r:id="rId2"/>
-    <p:sldId id="258" r:id="rId3"/>
-    <p:sldId id="260" r:id="rId4"/>
-    <p:sldId id="262" r:id="rId5"/>
-    <p:sldId id="261" r:id="rId6"/>
-    <p:sldId id="263" r:id="rId7"/>
-    <p:sldId id="264" r:id="rId8"/>
-    <p:sldId id="259" r:id="rId9"/>
-    <p:sldId id="266" r:id="rId10"/>
-    <p:sldId id="267" r:id="rId11"/>
-    <p:sldId id="268" r:id="rId12"/>
-    <p:sldId id="269" r:id="rId13"/>
-    <p:sldId id="270" r:id="rId14"/>
-    <p:sldId id="271" r:id="rId15"/>
-    <p:sldId id="272" r:id="rId16"/>
-    <p:sldId id="273" r:id="rId17"/>
-    <p:sldId id="274" r:id="rId18"/>
-    <p:sldId id="275" r:id="rId19"/>
-    <p:sldId id="276" r:id="rId20"/>
-    <p:sldId id="277" r:id="rId21"/>
-    <p:sldId id="278" r:id="rId22"/>
-    <p:sldId id="279" r:id="rId23"/>
-    <p:sldId id="281" r:id="rId24"/>
+    <p:sldId id="260" r:id="rId3"/>
+    <p:sldId id="262" r:id="rId4"/>
+    <p:sldId id="261" r:id="rId5"/>
+    <p:sldId id="263" r:id="rId6"/>
+    <p:sldId id="264" r:id="rId7"/>
+    <p:sldId id="259" r:id="rId8"/>
+    <p:sldId id="266" r:id="rId9"/>
+    <p:sldId id="267" r:id="rId10"/>
+    <p:sldId id="268" r:id="rId11"/>
+    <p:sldId id="269" r:id="rId12"/>
+    <p:sldId id="270" r:id="rId13"/>
+    <p:sldId id="271" r:id="rId14"/>
+    <p:sldId id="272" r:id="rId15"/>
+    <p:sldId id="273" r:id="rId16"/>
+    <p:sldId id="274" r:id="rId17"/>
+    <p:sldId id="275" r:id="rId18"/>
+    <p:sldId id="276" r:id="rId19"/>
+    <p:sldId id="277" r:id="rId20"/>
+    <p:sldId id="278" r:id="rId21"/>
+    <p:sldId id="279" r:id="rId22"/>
+    <p:sldId id="281" r:id="rId23"/>
   </p:sldIdLst>
   <p:sldSz cx="12192000" cy="6858000"/>
   <p:notesSz cx="6858000" cy="9144000"/>
@@ -2011,7 +2010,7 @@
           <a:p>
             <a:fld id="{EF1077DB-935E-4A0A-947A-D283B9F9F452}" type="datetimeFigureOut">
               <a:rPr lang="en-US" smtClean="0"/>
-              <a:t>2/1/2020</a:t>
+              <a:t>2/4/2020</a:t>
             </a:fld>
             <a:endParaRPr lang="en-US" dirty="0"/>
           </a:p>
@@ -2188,7 +2187,7 @@
           <a:p>
             <a:fld id="{58881107-E2F0-4FFB-BAD2-D68BB3595516}" type="datetimeFigureOut">
               <a:rPr lang="en-US" noProof="0" smtClean="0"/>
-              <a:t>2/1/2020</a:t>
+              <a:t>2/4/2020</a:t>
             </a:fld>
             <a:endParaRPr lang="en-US" noProof="0" dirty="0"/>
           </a:p>
@@ -23481,7 +23480,7 @@
           <a:p>
             <a:r>
               <a:rPr lang="en-US" dirty="0"/>
-              <a:t>Drivers Impacting the Housing Market in Atlanta</a:t>
+              <a:t>Drivers Impacting the Housing Market in Georgia</a:t>
             </a:r>
           </a:p>
         </p:txBody>
@@ -23546,362 +23545,6 @@
       </p:grpSpPr>
       <p:sp>
         <p:nvSpPr>
-          <p:cNvPr id="12" name="Title 11">
-            <a:extLst>
-              <a:ext uri="{FF2B5EF4-FFF2-40B4-BE49-F238E27FC236}">
-                <a16:creationId xmlns:a16="http://schemas.microsoft.com/office/drawing/2014/main" id="{6840293F-4671-41F0-81A3-F8908F7DBA05}"/>
-              </a:ext>
-            </a:extLst>
-          </p:cNvPr>
-          <p:cNvSpPr>
-            <a:spLocks noGrp="1"/>
-          </p:cNvSpPr>
-          <p:nvPr>
-            <p:ph type="title"/>
-          </p:nvPr>
-        </p:nvSpPr>
-        <p:spPr/>
-        <p:txBody>
-          <a:bodyPr/>
-          <a:lstStyle/>
-          <a:p>
-            <a:r>
-              <a:rPr lang="en-US" dirty="0"/>
-              <a:t>Market Opportunity Option 1</a:t>
-            </a:r>
-          </a:p>
-        </p:txBody>
-      </p:sp>
-      <p:sp>
-        <p:nvSpPr>
-          <p:cNvPr id="17" name="Text Placeholder 16">
-            <a:extLst>
-              <a:ext uri="{FF2B5EF4-FFF2-40B4-BE49-F238E27FC236}">
-                <a16:creationId xmlns:a16="http://schemas.microsoft.com/office/drawing/2014/main" id="{6A68A20E-73E6-4BDD-826F-851FE419CF78}"/>
-              </a:ext>
-            </a:extLst>
-          </p:cNvPr>
-          <p:cNvSpPr>
-            <a:spLocks noGrp="1"/>
-          </p:cNvSpPr>
-          <p:nvPr>
-            <p:ph type="body" sz="quarter" idx="32"/>
-          </p:nvPr>
-        </p:nvSpPr>
-        <p:spPr/>
-        <p:txBody>
-          <a:bodyPr/>
-          <a:lstStyle/>
-          <a:p>
-            <a:r>
-              <a:rPr lang="en-US" dirty="0"/>
-              <a:t>Lorem ipsum dolor sit amet, consectetur adipiscing elit. </a:t>
-            </a:r>
-          </a:p>
-        </p:txBody>
-      </p:sp>
-      <p:pic>
-        <p:nvPicPr>
-          <p:cNvPr id="5" name="Picture Placeholder 4" descr="Bullseye">
-            <a:extLst>
-              <a:ext uri="{FF2B5EF4-FFF2-40B4-BE49-F238E27FC236}">
-                <a16:creationId xmlns:a16="http://schemas.microsoft.com/office/drawing/2014/main" id="{54A3BFA2-FCD4-4F41-AAAD-8DAF2B85DA36}"/>
-              </a:ext>
-            </a:extLst>
-          </p:cNvPr>
-          <p:cNvPicPr>
-            <a:picLocks noGrp="1" noChangeAspect="1"/>
-          </p:cNvPicPr>
-          <p:nvPr>
-            <p:ph type="pic" sz="quarter" idx="33"/>
-          </p:nvPr>
-        </p:nvPicPr>
-        <p:blipFill>
-          <a:blip r:embed="rId2" cstate="screen">
-            <a:extLst>
-              <a:ext uri="{28A0092B-C50C-407E-A947-70E740481C1C}">
-                <a14:useLocalDpi xmlns:a14="http://schemas.microsoft.com/office/drawing/2010/main"/>
-              </a:ext>
-              <a:ext uri="{96DAC541-7B7A-43D3-8B79-37D633B846F1}">
-                <asvg:svgBlip xmlns:asvg="http://schemas.microsoft.com/office/drawing/2016/SVG/main" r:embed="rId3"/>
-              </a:ext>
-            </a:extLst>
-          </a:blip>
-          <a:srcRect/>
-          <a:stretch>
-            <a:fillRect/>
-          </a:stretch>
-        </p:blipFill>
-        <p:spPr/>
-      </p:pic>
-      <p:sp>
-        <p:nvSpPr>
-          <p:cNvPr id="14" name="Text Placeholder 13">
-            <a:extLst>
-              <a:ext uri="{FF2B5EF4-FFF2-40B4-BE49-F238E27FC236}">
-                <a16:creationId xmlns:a16="http://schemas.microsoft.com/office/drawing/2014/main" id="{7E56E477-6E54-4833-B1E4-56C1AC66C582}"/>
-              </a:ext>
-            </a:extLst>
-          </p:cNvPr>
-          <p:cNvSpPr>
-            <a:spLocks noGrp="1"/>
-          </p:cNvSpPr>
-          <p:nvPr>
-            <p:ph type="body" sz="quarter" idx="27"/>
-          </p:nvPr>
-        </p:nvSpPr>
-        <p:spPr/>
-        <p:txBody>
-          <a:bodyPr/>
-          <a:lstStyle/>
-          <a:p>
-            <a:r>
-              <a:rPr lang="en-US" dirty="0"/>
-              <a:t>$1B</a:t>
-            </a:r>
-          </a:p>
-        </p:txBody>
-      </p:sp>
-      <p:sp>
-        <p:nvSpPr>
-          <p:cNvPr id="15" name="Content Placeholder 14">
-            <a:extLst>
-              <a:ext uri="{FF2B5EF4-FFF2-40B4-BE49-F238E27FC236}">
-                <a16:creationId xmlns:a16="http://schemas.microsoft.com/office/drawing/2014/main" id="{7F07C326-ECF8-41DF-9B2E-D430DEFF9A67}"/>
-              </a:ext>
-            </a:extLst>
-          </p:cNvPr>
-          <p:cNvSpPr>
-            <a:spLocks noGrp="1"/>
-          </p:cNvSpPr>
-          <p:nvPr>
-            <p:ph sz="half" idx="29"/>
-          </p:nvPr>
-        </p:nvSpPr>
-        <p:spPr/>
-        <p:txBody>
-          <a:bodyPr/>
-          <a:lstStyle/>
-          <a:p>
-            <a:r>
-              <a:rPr lang="en-US" dirty="0"/>
-              <a:t>Lorem ipsum </a:t>
-            </a:r>
-            <a:r>
-              <a:rPr lang="en-US" noProof="1"/>
-              <a:t>dolor sit amet, consectetur adipiscing elit. </a:t>
-            </a:r>
-          </a:p>
-          <a:p>
-            <a:r>
-              <a:rPr lang="en-US" noProof="1"/>
-              <a:t>Etiam aliquet eu mi quis lacinia. Ut fermentum a magna ut eleifend. Integer convallis suscipit ante eu varius. </a:t>
-            </a:r>
-          </a:p>
-          <a:p>
-            <a:r>
-              <a:rPr lang="en-US" noProof="1"/>
-              <a:t>Morbi a purus dolor. Suspendisse sit amet ipsum finibus justo viverra blandit.</a:t>
-            </a:r>
-          </a:p>
-        </p:txBody>
-      </p:sp>
-      <p:pic>
-        <p:nvPicPr>
-          <p:cNvPr id="7" name="Picture Placeholder 6" descr="Lecturer">
-            <a:extLst>
-              <a:ext uri="{FF2B5EF4-FFF2-40B4-BE49-F238E27FC236}">
-                <a16:creationId xmlns:a16="http://schemas.microsoft.com/office/drawing/2014/main" id="{46483697-076C-45F1-BEB8-4E596D745014}"/>
-              </a:ext>
-            </a:extLst>
-          </p:cNvPr>
-          <p:cNvPicPr>
-            <a:picLocks noGrp="1" noChangeAspect="1"/>
-          </p:cNvPicPr>
-          <p:nvPr>
-            <p:ph type="pic" sz="quarter" idx="34"/>
-          </p:nvPr>
-        </p:nvPicPr>
-        <p:blipFill>
-          <a:blip r:embed="rId4" cstate="screen">
-            <a:extLst>
-              <a:ext uri="{28A0092B-C50C-407E-A947-70E740481C1C}">
-                <a14:useLocalDpi xmlns:a14="http://schemas.microsoft.com/office/drawing/2010/main"/>
-              </a:ext>
-              <a:ext uri="{96DAC541-7B7A-43D3-8B79-37D633B846F1}">
-                <asvg:svgBlip xmlns:asvg="http://schemas.microsoft.com/office/drawing/2016/SVG/main" r:embed="rId5"/>
-              </a:ext>
-            </a:extLst>
-          </a:blip>
-          <a:srcRect/>
-          <a:stretch>
-            <a:fillRect/>
-          </a:stretch>
-        </p:blipFill>
-        <p:spPr/>
-      </p:pic>
-      <p:sp>
-        <p:nvSpPr>
-          <p:cNvPr id="16" name="Text Placeholder 15">
-            <a:extLst>
-              <a:ext uri="{FF2B5EF4-FFF2-40B4-BE49-F238E27FC236}">
-                <a16:creationId xmlns:a16="http://schemas.microsoft.com/office/drawing/2014/main" id="{7A432125-2B7A-42E4-8AE0-79559A0082FD}"/>
-              </a:ext>
-            </a:extLst>
-          </p:cNvPr>
-          <p:cNvSpPr>
-            <a:spLocks noGrp="1"/>
-          </p:cNvSpPr>
-          <p:nvPr>
-            <p:ph type="body" sz="quarter" idx="30"/>
-          </p:nvPr>
-        </p:nvSpPr>
-        <p:spPr/>
-        <p:txBody>
-          <a:bodyPr/>
-          <a:lstStyle/>
-          <a:p>
-            <a:r>
-              <a:rPr lang="en-US" dirty="0"/>
-              <a:t>$2B</a:t>
-            </a:r>
-          </a:p>
-        </p:txBody>
-      </p:sp>
-      <p:sp>
-        <p:nvSpPr>
-          <p:cNvPr id="13" name="Content Placeholder 12">
-            <a:extLst>
-              <a:ext uri="{FF2B5EF4-FFF2-40B4-BE49-F238E27FC236}">
-                <a16:creationId xmlns:a16="http://schemas.microsoft.com/office/drawing/2014/main" id="{111E1D64-13B1-45CD-A29D-474622790A38}"/>
-              </a:ext>
-            </a:extLst>
-          </p:cNvPr>
-          <p:cNvSpPr>
-            <a:spLocks noGrp="1"/>
-          </p:cNvSpPr>
-          <p:nvPr>
-            <p:ph sz="half" idx="2"/>
-          </p:nvPr>
-        </p:nvSpPr>
-        <p:spPr/>
-        <p:txBody>
-          <a:bodyPr/>
-          <a:lstStyle/>
-          <a:p>
-            <a:r>
-              <a:rPr lang="en-US" dirty="0"/>
-              <a:t>Lorem ipsum </a:t>
-            </a:r>
-            <a:r>
-              <a:rPr lang="en-US" noProof="1"/>
-              <a:t>dolor sit amet, consectetur adipiscing elit. </a:t>
-            </a:r>
-          </a:p>
-          <a:p>
-            <a:r>
-              <a:rPr lang="en-US" noProof="1"/>
-              <a:t>Etiam aliquet eu mi quis lacinia. Ut fermentum a magna ut eleifend. Integer convallis suscipit ante eu varius. </a:t>
-            </a:r>
-          </a:p>
-          <a:p>
-            <a:r>
-              <a:rPr lang="en-US" noProof="1"/>
-              <a:t>Morbi a purus dolor. Suspendisse sit amet ipsum finibus justo viverra blandit.</a:t>
-            </a:r>
-          </a:p>
-        </p:txBody>
-      </p:sp>
-      <p:sp>
-        <p:nvSpPr>
-          <p:cNvPr id="3" name="Footer Placeholder 2">
-            <a:extLst>
-              <a:ext uri="{FF2B5EF4-FFF2-40B4-BE49-F238E27FC236}">
-                <a16:creationId xmlns:a16="http://schemas.microsoft.com/office/drawing/2014/main" id="{E103D420-AEB0-44F9-86F5-DB2505B0F4E7}"/>
-              </a:ext>
-            </a:extLst>
-          </p:cNvPr>
-          <p:cNvSpPr>
-            <a:spLocks noGrp="1"/>
-          </p:cNvSpPr>
-          <p:nvPr>
-            <p:ph type="ftr" sz="quarter" idx="10"/>
-          </p:nvPr>
-        </p:nvSpPr>
-        <p:spPr/>
-        <p:txBody>
-          <a:bodyPr/>
-          <a:lstStyle/>
-          <a:p>
-            <a:r>
-              <a:rPr lang="en-US" dirty="0"/>
-              <a:t>Add a footer</a:t>
-            </a:r>
-          </a:p>
-        </p:txBody>
-      </p:sp>
-      <p:sp>
-        <p:nvSpPr>
-          <p:cNvPr id="4" name="Slide Number Placeholder 3">
-            <a:extLst>
-              <a:ext uri="{FF2B5EF4-FFF2-40B4-BE49-F238E27FC236}">
-                <a16:creationId xmlns:a16="http://schemas.microsoft.com/office/drawing/2014/main" id="{A88525D2-29EF-4156-8E05-4971770BF1AF}"/>
-              </a:ext>
-            </a:extLst>
-          </p:cNvPr>
-          <p:cNvSpPr>
-            <a:spLocks noGrp="1"/>
-          </p:cNvSpPr>
-          <p:nvPr>
-            <p:ph type="sldNum" sz="quarter" idx="11"/>
-          </p:nvPr>
-        </p:nvSpPr>
-        <p:spPr/>
-        <p:txBody>
-          <a:bodyPr/>
-          <a:lstStyle/>
-          <a:p>
-            <a:fld id="{19B51A1E-902D-48AF-9020-955120F399B6}" type="slidenum">
-              <a:rPr lang="en-US" smtClean="0"/>
-              <a:pPr/>
-              <a:t>10</a:t>
-            </a:fld>
-            <a:endParaRPr lang="en-US" dirty="0"/>
-          </a:p>
-        </p:txBody>
-      </p:sp>
-    </p:spTree>
-    <p:extLst>
-      <p:ext uri="{BB962C8B-B14F-4D97-AF65-F5344CB8AC3E}">
-        <p14:creationId xmlns:p14="http://schemas.microsoft.com/office/powerpoint/2010/main" val="1234443194"/>
-      </p:ext>
-    </p:extLst>
-  </p:cSld>
-  <p:clrMapOvr>
-    <a:masterClrMapping/>
-  </p:clrMapOvr>
-</p:sld>
-</file>
-
-<file path=ppt/slides/slide11.xml><?xml version="1.0" encoding="utf-8"?>
-<p:sld xmlns:a="http://schemas.openxmlformats.org/drawingml/2006/main" xmlns:r="http://schemas.openxmlformats.org/officeDocument/2006/relationships" xmlns:p="http://schemas.openxmlformats.org/presentationml/2006/main">
-  <p:cSld>
-    <p:spTree>
-      <p:nvGrpSpPr>
-        <p:cNvPr id="1" name=""/>
-        <p:cNvGrpSpPr/>
-        <p:nvPr/>
-      </p:nvGrpSpPr>
-      <p:grpSpPr>
-        <a:xfrm>
-          <a:off x="0" y="0"/>
-          <a:ext cx="0" cy="0"/>
-          <a:chOff x="0" y="0"/>
-          <a:chExt cx="0" cy="0"/>
-        </a:xfrm>
-      </p:grpSpPr>
-      <p:sp>
-        <p:nvSpPr>
           <p:cNvPr id="23" name="Title 22">
             <a:extLst>
               <a:ext uri="{FF2B5EF4-FFF2-40B4-BE49-F238E27FC236}">
@@ -24258,7 +23901,7 @@
             <a:fld id="{19B51A1E-902D-48AF-9020-955120F399B6}" type="slidenum">
               <a:rPr lang="en-US" smtClean="0"/>
               <a:pPr/>
-              <a:t>11</a:t>
+              <a:t>10</a:t>
             </a:fld>
             <a:endParaRPr lang="en-US" dirty="0"/>
           </a:p>
@@ -24895,7 +24538,7 @@
 </p:sld>
 </file>
 
-<file path=ppt/slides/slide12.xml><?xml version="1.0" encoding="utf-8"?>
+<file path=ppt/slides/slide11.xml><?xml version="1.0" encoding="utf-8"?>
 <p:sld xmlns:a="http://schemas.openxmlformats.org/drawingml/2006/main" xmlns:r="http://schemas.openxmlformats.org/officeDocument/2006/relationships" xmlns:p="http://schemas.openxmlformats.org/presentationml/2006/main">
   <p:cSld>
     <p:spTree>
@@ -25165,7 +24808,7 @@
             <a:fld id="{19B51A1E-902D-48AF-9020-955120F399B6}" type="slidenum">
               <a:rPr lang="en-US" smtClean="0"/>
               <a:pPr/>
-              <a:t>12</a:t>
+              <a:t>11</a:t>
             </a:fld>
             <a:endParaRPr lang="en-US" dirty="0"/>
           </a:p>
@@ -25184,7 +24827,7 @@
 </p:sld>
 </file>
 
-<file path=ppt/slides/slide13.xml><?xml version="1.0" encoding="utf-8"?>
+<file path=ppt/slides/slide12.xml><?xml version="1.0" encoding="utf-8"?>
 <p:sld xmlns:a="http://schemas.openxmlformats.org/drawingml/2006/main" xmlns:r="http://schemas.openxmlformats.org/officeDocument/2006/relationships" xmlns:p="http://schemas.openxmlformats.org/presentationml/2006/main">
   <p:cSld>
     <p:spTree>
@@ -25754,7 +25397,7 @@
             <a:fld id="{19B51A1E-902D-48AF-9020-955120F399B6}" type="slidenum">
               <a:rPr lang="en-US" smtClean="0"/>
               <a:pPr/>
-              <a:t>13</a:t>
+              <a:t>12</a:t>
             </a:fld>
             <a:endParaRPr lang="en-US" dirty="0"/>
           </a:p>
@@ -25773,7 +25416,7 @@
 </p:sld>
 </file>
 
-<file path=ppt/slides/slide14.xml><?xml version="1.0" encoding="utf-8"?>
+<file path=ppt/slides/slide13.xml><?xml version="1.0" encoding="utf-8"?>
 <p:sld xmlns:a="http://schemas.openxmlformats.org/drawingml/2006/main" xmlns:r="http://schemas.openxmlformats.org/officeDocument/2006/relationships" xmlns:p="http://schemas.openxmlformats.org/presentationml/2006/main">
   <p:cSld>
     <p:spTree>
@@ -26168,7 +25811,7 @@
             <a:fld id="{19B51A1E-902D-48AF-9020-955120F399B6}" type="slidenum">
               <a:rPr lang="en-US" smtClean="0"/>
               <a:pPr/>
-              <a:t>14</a:t>
+              <a:t>13</a:t>
             </a:fld>
             <a:endParaRPr lang="en-US" dirty="0"/>
           </a:p>
@@ -26187,7 +25830,7 @@
 </p:sld>
 </file>
 
-<file path=ppt/slides/slide15.xml><?xml version="1.0" encoding="utf-8"?>
+<file path=ppt/slides/slide14.xml><?xml version="1.0" encoding="utf-8"?>
 <p:sld xmlns:a="http://schemas.openxmlformats.org/drawingml/2006/main" xmlns:r="http://schemas.openxmlformats.org/officeDocument/2006/relationships" xmlns:p="http://schemas.openxmlformats.org/presentationml/2006/main">
   <p:cSld>
     <p:spTree>
@@ -28639,7 +28282,7 @@
             <a:fld id="{19B51A1E-902D-48AF-9020-955120F399B6}" type="slidenum">
               <a:rPr lang="en-US" smtClean="0"/>
               <a:pPr/>
-              <a:t>15</a:t>
+              <a:t>14</a:t>
             </a:fld>
             <a:endParaRPr lang="en-US" dirty="0"/>
           </a:p>
@@ -28658,7 +28301,7 @@
 </p:sld>
 </file>
 
-<file path=ppt/slides/slide16.xml><?xml version="1.0" encoding="utf-8"?>
+<file path=ppt/slides/slide15.xml><?xml version="1.0" encoding="utf-8"?>
 <p:sld xmlns:a="http://schemas.openxmlformats.org/drawingml/2006/main" xmlns:r="http://schemas.openxmlformats.org/officeDocument/2006/relationships" xmlns:p="http://schemas.openxmlformats.org/presentationml/2006/main">
   <p:cSld>
     <p:spTree>
@@ -32205,7 +31848,7 @@
             <a:fld id="{19B51A1E-902D-48AF-9020-955120F399B6}" type="slidenum">
               <a:rPr lang="en-US" smtClean="0"/>
               <a:pPr/>
-              <a:t>16</a:t>
+              <a:t>15</a:t>
             </a:fld>
             <a:endParaRPr lang="en-US" dirty="0"/>
           </a:p>
@@ -32224,7 +31867,7 @@
 </p:sld>
 </file>
 
-<file path=ppt/slides/slide17.xml><?xml version="1.0" encoding="utf-8"?>
+<file path=ppt/slides/slide16.xml><?xml version="1.0" encoding="utf-8"?>
 <p:sld xmlns:a="http://schemas.openxmlformats.org/drawingml/2006/main" xmlns:r="http://schemas.openxmlformats.org/officeDocument/2006/relationships" xmlns:p="http://schemas.openxmlformats.org/presentationml/2006/main">
   <p:cSld>
     <p:spTree>
@@ -37935,7 +37578,7 @@
             <a:fld id="{19B51A1E-902D-48AF-9020-955120F399B6}" type="slidenum">
               <a:rPr lang="en-US" smtClean="0"/>
               <a:pPr/>
-              <a:t>17</a:t>
+              <a:t>16</a:t>
             </a:fld>
             <a:endParaRPr lang="en-US" dirty="0"/>
           </a:p>
@@ -37945,6 +37588,495 @@
     <p:extLst>
       <p:ext uri="{BB962C8B-B14F-4D97-AF65-F5344CB8AC3E}">
         <p14:creationId xmlns:p14="http://schemas.microsoft.com/office/powerpoint/2010/main" val="1877877056"/>
+      </p:ext>
+    </p:extLst>
+  </p:cSld>
+  <p:clrMapOvr>
+    <a:masterClrMapping/>
+  </p:clrMapOvr>
+</p:sld>
+</file>
+
+<file path=ppt/slides/slide17.xml><?xml version="1.0" encoding="utf-8"?>
+<p:sld xmlns:a="http://schemas.openxmlformats.org/drawingml/2006/main" xmlns:r="http://schemas.openxmlformats.org/officeDocument/2006/relationships" xmlns:p="http://schemas.openxmlformats.org/presentationml/2006/main">
+  <p:cSld>
+    <p:spTree>
+      <p:nvGrpSpPr>
+        <p:cNvPr id="1" name=""/>
+        <p:cNvGrpSpPr/>
+        <p:nvPr/>
+      </p:nvGrpSpPr>
+      <p:grpSpPr>
+        <a:xfrm>
+          <a:off x="0" y="0"/>
+          <a:ext cx="0" cy="0"/>
+          <a:chOff x="0" y="0"/>
+          <a:chExt cx="0" cy="0"/>
+        </a:xfrm>
+      </p:grpSpPr>
+      <p:sp>
+        <p:nvSpPr>
+          <p:cNvPr id="2" name="Title 1">
+            <a:extLst>
+              <a:ext uri="{FF2B5EF4-FFF2-40B4-BE49-F238E27FC236}">
+                <a16:creationId xmlns:a16="http://schemas.microsoft.com/office/drawing/2014/main" id="{26BA31E7-6C29-45A4-877E-3AF8619A88B4}"/>
+              </a:ext>
+            </a:extLst>
+          </p:cNvPr>
+          <p:cNvSpPr>
+            <a:spLocks noGrp="1"/>
+          </p:cNvSpPr>
+          <p:nvPr>
+            <p:ph type="title"/>
+          </p:nvPr>
+        </p:nvSpPr>
+        <p:spPr/>
+        <p:txBody>
+          <a:bodyPr/>
+          <a:lstStyle/>
+          <a:p>
+            <a:r>
+              <a:rPr lang="en-US" dirty="0"/>
+              <a:t>Team</a:t>
+            </a:r>
+          </a:p>
+        </p:txBody>
+      </p:sp>
+      <p:pic>
+        <p:nvPicPr>
+          <p:cNvPr id="22" name="Picture Placeholder 21" descr="male team member photo">
+            <a:extLst>
+              <a:ext uri="{FF2B5EF4-FFF2-40B4-BE49-F238E27FC236}">
+                <a16:creationId xmlns:a16="http://schemas.microsoft.com/office/drawing/2014/main" id="{8EA1FFD3-9F86-4FE3-8943-80097EC9BC02}"/>
+              </a:ext>
+            </a:extLst>
+          </p:cNvPr>
+          <p:cNvPicPr>
+            <a:picLocks noGrp="1" noChangeAspect="1"/>
+          </p:cNvPicPr>
+          <p:nvPr>
+            <p:ph type="pic" sz="quarter" idx="12"/>
+          </p:nvPr>
+        </p:nvPicPr>
+        <p:blipFill>
+          <a:blip r:embed="rId2">
+            <a:extLst>
+              <a:ext uri="{28A0092B-C50C-407E-A947-70E740481C1C}">
+                <a14:useLocalDpi xmlns:a14="http://schemas.microsoft.com/office/drawing/2010/main"/>
+              </a:ext>
+            </a:extLst>
+          </a:blip>
+          <a:stretch>
+            <a:fillRect/>
+          </a:stretch>
+        </p:blipFill>
+        <p:spPr>
+          <a:xfrm>
+            <a:off x="512915" y="2319681"/>
+            <a:ext cx="1352367" cy="1352367"/>
+          </a:xfrm>
+        </p:spPr>
+      </p:pic>
+      <p:sp>
+        <p:nvSpPr>
+          <p:cNvPr id="7" name="Text Placeholder 6">
+            <a:extLst>
+              <a:ext uri="{FF2B5EF4-FFF2-40B4-BE49-F238E27FC236}">
+                <a16:creationId xmlns:a16="http://schemas.microsoft.com/office/drawing/2014/main" id="{29E1AA36-C61C-4443-9B7E-2D25BDFBFF8B}"/>
+              </a:ext>
+            </a:extLst>
+          </p:cNvPr>
+          <p:cNvSpPr>
+            <a:spLocks noGrp="1"/>
+          </p:cNvSpPr>
+          <p:nvPr>
+            <p:ph type="body" sz="quarter" idx="13"/>
+          </p:nvPr>
+        </p:nvSpPr>
+        <p:spPr/>
+        <p:txBody>
+          <a:bodyPr/>
+          <a:lstStyle/>
+          <a:p>
+            <a:r>
+              <a:rPr lang="en-US" noProof="1"/>
+              <a:t>Mirjam</a:t>
+            </a:r>
+            <a:br>
+              <a:rPr lang="en-US" noProof="1"/>
+            </a:br>
+            <a:r>
+              <a:rPr lang="en-US" noProof="1"/>
+              <a:t>Nils</a:t>
+            </a:r>
+          </a:p>
+        </p:txBody>
+      </p:sp>
+      <p:sp>
+        <p:nvSpPr>
+          <p:cNvPr id="9" name="Text Placeholder 8">
+            <a:extLst>
+              <a:ext uri="{FF2B5EF4-FFF2-40B4-BE49-F238E27FC236}">
+                <a16:creationId xmlns:a16="http://schemas.microsoft.com/office/drawing/2014/main" id="{0A76803A-88FD-4CE1-80B6-2094757E4E4C}"/>
+              </a:ext>
+            </a:extLst>
+          </p:cNvPr>
+          <p:cNvSpPr>
+            <a:spLocks noGrp="1"/>
+          </p:cNvSpPr>
+          <p:nvPr>
+            <p:ph type="body" sz="quarter" idx="33"/>
+          </p:nvPr>
+        </p:nvSpPr>
+        <p:spPr/>
+        <p:txBody>
+          <a:bodyPr/>
+          <a:lstStyle/>
+          <a:p>
+            <a:r>
+              <a:rPr lang="en-US" dirty="0"/>
+              <a:t>COO</a:t>
+            </a:r>
+          </a:p>
+        </p:txBody>
+      </p:sp>
+      <p:sp>
+        <p:nvSpPr>
+          <p:cNvPr id="8" name="Text Placeholder 7">
+            <a:extLst>
+              <a:ext uri="{FF2B5EF4-FFF2-40B4-BE49-F238E27FC236}">
+                <a16:creationId xmlns:a16="http://schemas.microsoft.com/office/drawing/2014/main" id="{3CADB35D-93F4-44DB-AD3E-7480E28AB3D5}"/>
+              </a:ext>
+            </a:extLst>
+          </p:cNvPr>
+          <p:cNvSpPr>
+            <a:spLocks noGrp="1"/>
+          </p:cNvSpPr>
+          <p:nvPr>
+            <p:ph type="body" sz="quarter" idx="14"/>
+          </p:nvPr>
+        </p:nvSpPr>
+        <p:spPr/>
+        <p:txBody>
+          <a:bodyPr/>
+          <a:lstStyle/>
+          <a:p>
+            <a:r>
+              <a:rPr lang="en-US" dirty="0"/>
+              <a:t>Lorem </a:t>
+            </a:r>
+            <a:r>
+              <a:rPr lang="en-US" noProof="1"/>
+              <a:t>ipsum dolor sit amet, consectetur adipiscing elit. Etiam aliquet eu mi quis lacinia. Ut fermentum a magna ut eleifend. Integer convallis suscipit ante eu varius. </a:t>
+            </a:r>
+          </a:p>
+        </p:txBody>
+      </p:sp>
+      <p:pic>
+        <p:nvPicPr>
+          <p:cNvPr id="24" name="Picture Placeholder 23" descr="female team member placeholder">
+            <a:extLst>
+              <a:ext uri="{FF2B5EF4-FFF2-40B4-BE49-F238E27FC236}">
+                <a16:creationId xmlns:a16="http://schemas.microsoft.com/office/drawing/2014/main" id="{5B6CD8F1-0725-42FC-B20D-9C4BE0EA744A}"/>
+              </a:ext>
+            </a:extLst>
+          </p:cNvPr>
+          <p:cNvPicPr>
+            <a:picLocks noGrp="1" noChangeAspect="1"/>
+          </p:cNvPicPr>
+          <p:nvPr>
+            <p:ph type="pic" sz="quarter" idx="34"/>
+          </p:nvPr>
+        </p:nvPicPr>
+        <p:blipFill>
+          <a:blip r:embed="rId3" cstate="screen">
+            <a:grayscl/>
+            <a:extLst>
+              <a:ext uri="{28A0092B-C50C-407E-A947-70E740481C1C}">
+                <a14:useLocalDpi xmlns:a14="http://schemas.microsoft.com/office/drawing/2010/main"/>
+              </a:ext>
+            </a:extLst>
+          </a:blip>
+          <a:srcRect/>
+          <a:stretch>
+            <a:fillRect/>
+          </a:stretch>
+        </p:blipFill>
+        <p:spPr/>
+      </p:pic>
+      <p:sp>
+        <p:nvSpPr>
+          <p:cNvPr id="11" name="Text Placeholder 10">
+            <a:extLst>
+              <a:ext uri="{FF2B5EF4-FFF2-40B4-BE49-F238E27FC236}">
+                <a16:creationId xmlns:a16="http://schemas.microsoft.com/office/drawing/2014/main" id="{7395C3A3-4012-4B8A-BA87-C3DD52DCB1A3}"/>
+              </a:ext>
+            </a:extLst>
+          </p:cNvPr>
+          <p:cNvSpPr>
+            <a:spLocks noGrp="1"/>
+          </p:cNvSpPr>
+          <p:nvPr>
+            <p:ph type="body" sz="quarter" idx="35"/>
+          </p:nvPr>
+        </p:nvSpPr>
+        <p:spPr/>
+        <p:txBody>
+          <a:bodyPr/>
+          <a:lstStyle/>
+          <a:p>
+            <a:r>
+              <a:rPr lang="en-US" noProof="1"/>
+              <a:t>Victoria Lindqvist</a:t>
+            </a:r>
+          </a:p>
+        </p:txBody>
+      </p:sp>
+      <p:sp>
+        <p:nvSpPr>
+          <p:cNvPr id="13" name="Text Placeholder 12">
+            <a:extLst>
+              <a:ext uri="{FF2B5EF4-FFF2-40B4-BE49-F238E27FC236}">
+                <a16:creationId xmlns:a16="http://schemas.microsoft.com/office/drawing/2014/main" id="{3BB20678-EE46-4E7F-B9D0-C0041F56D537}"/>
+              </a:ext>
+            </a:extLst>
+          </p:cNvPr>
+          <p:cNvSpPr>
+            <a:spLocks noGrp="1"/>
+          </p:cNvSpPr>
+          <p:nvPr>
+            <p:ph type="body" sz="quarter" idx="37"/>
+          </p:nvPr>
+        </p:nvSpPr>
+        <p:spPr/>
+        <p:txBody>
+          <a:bodyPr/>
+          <a:lstStyle/>
+          <a:p>
+            <a:r>
+              <a:rPr lang="en-US" dirty="0"/>
+              <a:t>COB</a:t>
+            </a:r>
+          </a:p>
+        </p:txBody>
+      </p:sp>
+      <p:sp>
+        <p:nvSpPr>
+          <p:cNvPr id="12" name="Text Placeholder 11">
+            <a:extLst>
+              <a:ext uri="{FF2B5EF4-FFF2-40B4-BE49-F238E27FC236}">
+                <a16:creationId xmlns:a16="http://schemas.microsoft.com/office/drawing/2014/main" id="{11C12F6F-1EB4-4699-B57C-58486A1A22D1}"/>
+              </a:ext>
+            </a:extLst>
+          </p:cNvPr>
+          <p:cNvSpPr>
+            <a:spLocks noGrp="1"/>
+          </p:cNvSpPr>
+          <p:nvPr>
+            <p:ph type="body" sz="quarter" idx="36"/>
+          </p:nvPr>
+        </p:nvSpPr>
+        <p:spPr/>
+        <p:txBody>
+          <a:bodyPr/>
+          <a:lstStyle/>
+          <a:p>
+            <a:r>
+              <a:rPr lang="en-US" dirty="0"/>
+              <a:t>Lorem </a:t>
+            </a:r>
+            <a:r>
+              <a:rPr lang="en-US" noProof="1"/>
+              <a:t>ipsum dolor sit amet, consectetur adipiscing elit. Etiam aliquet eu mi quis lacinia. Ut fermentum a magna ut eleifend. Integer convallis suscipit ante eu varius. </a:t>
+            </a:r>
+          </a:p>
+        </p:txBody>
+      </p:sp>
+      <p:pic>
+        <p:nvPicPr>
+          <p:cNvPr id="26" name="Picture Placeholder 25" descr="female team member photo">
+            <a:extLst>
+              <a:ext uri="{FF2B5EF4-FFF2-40B4-BE49-F238E27FC236}">
+                <a16:creationId xmlns:a16="http://schemas.microsoft.com/office/drawing/2014/main" id="{1CB7C8E8-0B2D-48EA-B38A-8824335022AB}"/>
+              </a:ext>
+            </a:extLst>
+          </p:cNvPr>
+          <p:cNvPicPr>
+            <a:picLocks noGrp="1" noChangeAspect="1"/>
+          </p:cNvPicPr>
+          <p:nvPr>
+            <p:ph type="pic" sz="quarter" idx="38"/>
+          </p:nvPr>
+        </p:nvPicPr>
+        <p:blipFill>
+          <a:blip r:embed="rId4">
+            <a:extLst>
+              <a:ext uri="{28A0092B-C50C-407E-A947-70E740481C1C}">
+                <a14:useLocalDpi xmlns:a14="http://schemas.microsoft.com/office/drawing/2010/main"/>
+              </a:ext>
+            </a:extLst>
+          </a:blip>
+          <a:stretch>
+            <a:fillRect/>
+          </a:stretch>
+        </p:blipFill>
+        <p:spPr>
+          <a:xfrm>
+            <a:off x="8533512" y="2319681"/>
+            <a:ext cx="1352367" cy="1352367"/>
+          </a:xfrm>
+        </p:spPr>
+      </p:pic>
+      <p:sp>
+        <p:nvSpPr>
+          <p:cNvPr id="15" name="Text Placeholder 14">
+            <a:extLst>
+              <a:ext uri="{FF2B5EF4-FFF2-40B4-BE49-F238E27FC236}">
+                <a16:creationId xmlns:a16="http://schemas.microsoft.com/office/drawing/2014/main" id="{7703A7B9-2572-4305-BA72-39B4336FCD31}"/>
+              </a:ext>
+            </a:extLst>
+          </p:cNvPr>
+          <p:cNvSpPr>
+            <a:spLocks noGrp="1"/>
+          </p:cNvSpPr>
+          <p:nvPr>
+            <p:ph type="body" sz="quarter" idx="39"/>
+          </p:nvPr>
+        </p:nvSpPr>
+        <p:spPr/>
+        <p:txBody>
+          <a:bodyPr/>
+          <a:lstStyle/>
+          <a:p>
+            <a:r>
+              <a:rPr lang="en-US" noProof="1"/>
+              <a:t>Angelica Astrom</a:t>
+            </a:r>
+          </a:p>
+        </p:txBody>
+      </p:sp>
+      <p:sp>
+        <p:nvSpPr>
+          <p:cNvPr id="17" name="Text Placeholder 16">
+            <a:extLst>
+              <a:ext uri="{FF2B5EF4-FFF2-40B4-BE49-F238E27FC236}">
+                <a16:creationId xmlns:a16="http://schemas.microsoft.com/office/drawing/2014/main" id="{2A7E314C-86D5-44F5-8659-DA2501E7C6B8}"/>
+              </a:ext>
+            </a:extLst>
+          </p:cNvPr>
+          <p:cNvSpPr>
+            <a:spLocks noGrp="1"/>
+          </p:cNvSpPr>
+          <p:nvPr>
+            <p:ph type="body" sz="quarter" idx="41"/>
+          </p:nvPr>
+        </p:nvSpPr>
+        <p:spPr/>
+        <p:txBody>
+          <a:bodyPr/>
+          <a:lstStyle/>
+          <a:p>
+            <a:r>
+              <a:rPr lang="en-US" dirty="0"/>
+              <a:t>CFO</a:t>
+            </a:r>
+          </a:p>
+        </p:txBody>
+      </p:sp>
+      <p:sp>
+        <p:nvSpPr>
+          <p:cNvPr id="16" name="Text Placeholder 15">
+            <a:extLst>
+              <a:ext uri="{FF2B5EF4-FFF2-40B4-BE49-F238E27FC236}">
+                <a16:creationId xmlns:a16="http://schemas.microsoft.com/office/drawing/2014/main" id="{2E37AB88-81A1-49DC-9D09-F9E5B658A017}"/>
+              </a:ext>
+            </a:extLst>
+          </p:cNvPr>
+          <p:cNvSpPr>
+            <a:spLocks noGrp="1"/>
+          </p:cNvSpPr>
+          <p:nvPr>
+            <p:ph type="body" sz="quarter" idx="40"/>
+          </p:nvPr>
+        </p:nvSpPr>
+        <p:spPr/>
+        <p:txBody>
+          <a:bodyPr/>
+          <a:lstStyle/>
+          <a:p>
+            <a:r>
+              <a:rPr lang="en-US" dirty="0"/>
+              <a:t>Lorem </a:t>
+            </a:r>
+            <a:r>
+              <a:rPr lang="en-US" noProof="1"/>
+              <a:t>ipsum dolor sit amet, consectetur adipiscing elit. Etiam aliquet eu mi quis lacinia. Ut fermentum a magna ut eleifend. Integer convallis suscipit ante eu varius. </a:t>
+            </a:r>
+          </a:p>
+        </p:txBody>
+      </p:sp>
+      <p:sp>
+        <p:nvSpPr>
+          <p:cNvPr id="3" name="Footer Placeholder 2">
+            <a:extLst>
+              <a:ext uri="{FF2B5EF4-FFF2-40B4-BE49-F238E27FC236}">
+                <a16:creationId xmlns:a16="http://schemas.microsoft.com/office/drawing/2014/main" id="{8C436714-A103-4874-ABDB-6133C91C9E0E}"/>
+              </a:ext>
+            </a:extLst>
+          </p:cNvPr>
+          <p:cNvSpPr>
+            <a:spLocks noGrp="1"/>
+          </p:cNvSpPr>
+          <p:nvPr>
+            <p:ph type="ftr" sz="quarter" idx="10"/>
+          </p:nvPr>
+        </p:nvSpPr>
+        <p:spPr/>
+        <p:txBody>
+          <a:bodyPr/>
+          <a:lstStyle/>
+          <a:p>
+            <a:r>
+              <a:rPr lang="en-US" dirty="0"/>
+              <a:t>Add a footer</a:t>
+            </a:r>
+          </a:p>
+        </p:txBody>
+      </p:sp>
+      <p:sp>
+        <p:nvSpPr>
+          <p:cNvPr id="4" name="Slide Number Placeholder 3">
+            <a:extLst>
+              <a:ext uri="{FF2B5EF4-FFF2-40B4-BE49-F238E27FC236}">
+                <a16:creationId xmlns:a16="http://schemas.microsoft.com/office/drawing/2014/main" id="{4D6C5279-C636-4D97-8B89-DAC480104F75}"/>
+              </a:ext>
+            </a:extLst>
+          </p:cNvPr>
+          <p:cNvSpPr>
+            <a:spLocks noGrp="1"/>
+          </p:cNvSpPr>
+          <p:nvPr>
+            <p:ph type="sldNum" sz="quarter" idx="11"/>
+          </p:nvPr>
+        </p:nvSpPr>
+        <p:spPr/>
+        <p:txBody>
+          <a:bodyPr/>
+          <a:lstStyle/>
+          <a:p>
+            <a:fld id="{19B51A1E-902D-48AF-9020-955120F399B6}" type="slidenum">
+              <a:rPr lang="en-US" smtClean="0"/>
+              <a:pPr/>
+              <a:t>17</a:t>
+            </a:fld>
+            <a:endParaRPr lang="en-US" dirty="0"/>
+          </a:p>
+        </p:txBody>
+      </p:sp>
+    </p:spTree>
+    <p:extLst>
+      <p:ext uri="{BB962C8B-B14F-4D97-AF65-F5344CB8AC3E}">
+        <p14:creationId xmlns:p14="http://schemas.microsoft.com/office/powerpoint/2010/main" val="167904717"/>
       </p:ext>
     </p:extLst>
   </p:cSld>
@@ -37976,495 +38108,6 @@
           <p:cNvPr id="2" name="Title 1">
             <a:extLst>
               <a:ext uri="{FF2B5EF4-FFF2-40B4-BE49-F238E27FC236}">
-                <a16:creationId xmlns:a16="http://schemas.microsoft.com/office/drawing/2014/main" id="{26BA31E7-6C29-45A4-877E-3AF8619A88B4}"/>
-              </a:ext>
-            </a:extLst>
-          </p:cNvPr>
-          <p:cNvSpPr>
-            <a:spLocks noGrp="1"/>
-          </p:cNvSpPr>
-          <p:nvPr>
-            <p:ph type="title"/>
-          </p:nvPr>
-        </p:nvSpPr>
-        <p:spPr/>
-        <p:txBody>
-          <a:bodyPr/>
-          <a:lstStyle/>
-          <a:p>
-            <a:r>
-              <a:rPr lang="en-US" dirty="0"/>
-              <a:t>Team</a:t>
-            </a:r>
-          </a:p>
-        </p:txBody>
-      </p:sp>
-      <p:pic>
-        <p:nvPicPr>
-          <p:cNvPr id="22" name="Picture Placeholder 21" descr="male team member photo">
-            <a:extLst>
-              <a:ext uri="{FF2B5EF4-FFF2-40B4-BE49-F238E27FC236}">
-                <a16:creationId xmlns:a16="http://schemas.microsoft.com/office/drawing/2014/main" id="{8EA1FFD3-9F86-4FE3-8943-80097EC9BC02}"/>
-              </a:ext>
-            </a:extLst>
-          </p:cNvPr>
-          <p:cNvPicPr>
-            <a:picLocks noGrp="1" noChangeAspect="1"/>
-          </p:cNvPicPr>
-          <p:nvPr>
-            <p:ph type="pic" sz="quarter" idx="12"/>
-          </p:nvPr>
-        </p:nvPicPr>
-        <p:blipFill>
-          <a:blip r:embed="rId2">
-            <a:extLst>
-              <a:ext uri="{28A0092B-C50C-407E-A947-70E740481C1C}">
-                <a14:useLocalDpi xmlns:a14="http://schemas.microsoft.com/office/drawing/2010/main"/>
-              </a:ext>
-            </a:extLst>
-          </a:blip>
-          <a:stretch>
-            <a:fillRect/>
-          </a:stretch>
-        </p:blipFill>
-        <p:spPr>
-          <a:xfrm>
-            <a:off x="512915" y="2319681"/>
-            <a:ext cx="1352367" cy="1352367"/>
-          </a:xfrm>
-        </p:spPr>
-      </p:pic>
-      <p:sp>
-        <p:nvSpPr>
-          <p:cNvPr id="7" name="Text Placeholder 6">
-            <a:extLst>
-              <a:ext uri="{FF2B5EF4-FFF2-40B4-BE49-F238E27FC236}">
-                <a16:creationId xmlns:a16="http://schemas.microsoft.com/office/drawing/2014/main" id="{29E1AA36-C61C-4443-9B7E-2D25BDFBFF8B}"/>
-              </a:ext>
-            </a:extLst>
-          </p:cNvPr>
-          <p:cNvSpPr>
-            <a:spLocks noGrp="1"/>
-          </p:cNvSpPr>
-          <p:nvPr>
-            <p:ph type="body" sz="quarter" idx="13"/>
-          </p:nvPr>
-        </p:nvSpPr>
-        <p:spPr/>
-        <p:txBody>
-          <a:bodyPr/>
-          <a:lstStyle/>
-          <a:p>
-            <a:r>
-              <a:rPr lang="en-US" noProof="1"/>
-              <a:t>Mirjam</a:t>
-            </a:r>
-            <a:br>
-              <a:rPr lang="en-US" noProof="1"/>
-            </a:br>
-            <a:r>
-              <a:rPr lang="en-US" noProof="1"/>
-              <a:t>Nils</a:t>
-            </a:r>
-          </a:p>
-        </p:txBody>
-      </p:sp>
-      <p:sp>
-        <p:nvSpPr>
-          <p:cNvPr id="9" name="Text Placeholder 8">
-            <a:extLst>
-              <a:ext uri="{FF2B5EF4-FFF2-40B4-BE49-F238E27FC236}">
-                <a16:creationId xmlns:a16="http://schemas.microsoft.com/office/drawing/2014/main" id="{0A76803A-88FD-4CE1-80B6-2094757E4E4C}"/>
-              </a:ext>
-            </a:extLst>
-          </p:cNvPr>
-          <p:cNvSpPr>
-            <a:spLocks noGrp="1"/>
-          </p:cNvSpPr>
-          <p:nvPr>
-            <p:ph type="body" sz="quarter" idx="33"/>
-          </p:nvPr>
-        </p:nvSpPr>
-        <p:spPr/>
-        <p:txBody>
-          <a:bodyPr/>
-          <a:lstStyle/>
-          <a:p>
-            <a:r>
-              <a:rPr lang="en-US" dirty="0"/>
-              <a:t>COO</a:t>
-            </a:r>
-          </a:p>
-        </p:txBody>
-      </p:sp>
-      <p:sp>
-        <p:nvSpPr>
-          <p:cNvPr id="8" name="Text Placeholder 7">
-            <a:extLst>
-              <a:ext uri="{FF2B5EF4-FFF2-40B4-BE49-F238E27FC236}">
-                <a16:creationId xmlns:a16="http://schemas.microsoft.com/office/drawing/2014/main" id="{3CADB35D-93F4-44DB-AD3E-7480E28AB3D5}"/>
-              </a:ext>
-            </a:extLst>
-          </p:cNvPr>
-          <p:cNvSpPr>
-            <a:spLocks noGrp="1"/>
-          </p:cNvSpPr>
-          <p:nvPr>
-            <p:ph type="body" sz="quarter" idx="14"/>
-          </p:nvPr>
-        </p:nvSpPr>
-        <p:spPr/>
-        <p:txBody>
-          <a:bodyPr/>
-          <a:lstStyle/>
-          <a:p>
-            <a:r>
-              <a:rPr lang="en-US" dirty="0"/>
-              <a:t>Lorem </a:t>
-            </a:r>
-            <a:r>
-              <a:rPr lang="en-US" noProof="1"/>
-              <a:t>ipsum dolor sit amet, consectetur adipiscing elit. Etiam aliquet eu mi quis lacinia. Ut fermentum a magna ut eleifend. Integer convallis suscipit ante eu varius. </a:t>
-            </a:r>
-          </a:p>
-        </p:txBody>
-      </p:sp>
-      <p:pic>
-        <p:nvPicPr>
-          <p:cNvPr id="24" name="Picture Placeholder 23" descr="female team member placeholder">
-            <a:extLst>
-              <a:ext uri="{FF2B5EF4-FFF2-40B4-BE49-F238E27FC236}">
-                <a16:creationId xmlns:a16="http://schemas.microsoft.com/office/drawing/2014/main" id="{5B6CD8F1-0725-42FC-B20D-9C4BE0EA744A}"/>
-              </a:ext>
-            </a:extLst>
-          </p:cNvPr>
-          <p:cNvPicPr>
-            <a:picLocks noGrp="1" noChangeAspect="1"/>
-          </p:cNvPicPr>
-          <p:nvPr>
-            <p:ph type="pic" sz="quarter" idx="34"/>
-          </p:nvPr>
-        </p:nvPicPr>
-        <p:blipFill>
-          <a:blip r:embed="rId3" cstate="screen">
-            <a:grayscl/>
-            <a:extLst>
-              <a:ext uri="{28A0092B-C50C-407E-A947-70E740481C1C}">
-                <a14:useLocalDpi xmlns:a14="http://schemas.microsoft.com/office/drawing/2010/main"/>
-              </a:ext>
-            </a:extLst>
-          </a:blip>
-          <a:srcRect/>
-          <a:stretch>
-            <a:fillRect/>
-          </a:stretch>
-        </p:blipFill>
-        <p:spPr/>
-      </p:pic>
-      <p:sp>
-        <p:nvSpPr>
-          <p:cNvPr id="11" name="Text Placeholder 10">
-            <a:extLst>
-              <a:ext uri="{FF2B5EF4-FFF2-40B4-BE49-F238E27FC236}">
-                <a16:creationId xmlns:a16="http://schemas.microsoft.com/office/drawing/2014/main" id="{7395C3A3-4012-4B8A-BA87-C3DD52DCB1A3}"/>
-              </a:ext>
-            </a:extLst>
-          </p:cNvPr>
-          <p:cNvSpPr>
-            <a:spLocks noGrp="1"/>
-          </p:cNvSpPr>
-          <p:nvPr>
-            <p:ph type="body" sz="quarter" idx="35"/>
-          </p:nvPr>
-        </p:nvSpPr>
-        <p:spPr/>
-        <p:txBody>
-          <a:bodyPr/>
-          <a:lstStyle/>
-          <a:p>
-            <a:r>
-              <a:rPr lang="en-US" noProof="1"/>
-              <a:t>Victoria Lindqvist</a:t>
-            </a:r>
-          </a:p>
-        </p:txBody>
-      </p:sp>
-      <p:sp>
-        <p:nvSpPr>
-          <p:cNvPr id="13" name="Text Placeholder 12">
-            <a:extLst>
-              <a:ext uri="{FF2B5EF4-FFF2-40B4-BE49-F238E27FC236}">
-                <a16:creationId xmlns:a16="http://schemas.microsoft.com/office/drawing/2014/main" id="{3BB20678-EE46-4E7F-B9D0-C0041F56D537}"/>
-              </a:ext>
-            </a:extLst>
-          </p:cNvPr>
-          <p:cNvSpPr>
-            <a:spLocks noGrp="1"/>
-          </p:cNvSpPr>
-          <p:nvPr>
-            <p:ph type="body" sz="quarter" idx="37"/>
-          </p:nvPr>
-        </p:nvSpPr>
-        <p:spPr/>
-        <p:txBody>
-          <a:bodyPr/>
-          <a:lstStyle/>
-          <a:p>
-            <a:r>
-              <a:rPr lang="en-US" dirty="0"/>
-              <a:t>COB</a:t>
-            </a:r>
-          </a:p>
-        </p:txBody>
-      </p:sp>
-      <p:sp>
-        <p:nvSpPr>
-          <p:cNvPr id="12" name="Text Placeholder 11">
-            <a:extLst>
-              <a:ext uri="{FF2B5EF4-FFF2-40B4-BE49-F238E27FC236}">
-                <a16:creationId xmlns:a16="http://schemas.microsoft.com/office/drawing/2014/main" id="{11C12F6F-1EB4-4699-B57C-58486A1A22D1}"/>
-              </a:ext>
-            </a:extLst>
-          </p:cNvPr>
-          <p:cNvSpPr>
-            <a:spLocks noGrp="1"/>
-          </p:cNvSpPr>
-          <p:nvPr>
-            <p:ph type="body" sz="quarter" idx="36"/>
-          </p:nvPr>
-        </p:nvSpPr>
-        <p:spPr/>
-        <p:txBody>
-          <a:bodyPr/>
-          <a:lstStyle/>
-          <a:p>
-            <a:r>
-              <a:rPr lang="en-US" dirty="0"/>
-              <a:t>Lorem </a:t>
-            </a:r>
-            <a:r>
-              <a:rPr lang="en-US" noProof="1"/>
-              <a:t>ipsum dolor sit amet, consectetur adipiscing elit. Etiam aliquet eu mi quis lacinia. Ut fermentum a magna ut eleifend. Integer convallis suscipit ante eu varius. </a:t>
-            </a:r>
-          </a:p>
-        </p:txBody>
-      </p:sp>
-      <p:pic>
-        <p:nvPicPr>
-          <p:cNvPr id="26" name="Picture Placeholder 25" descr="female team member photo">
-            <a:extLst>
-              <a:ext uri="{FF2B5EF4-FFF2-40B4-BE49-F238E27FC236}">
-                <a16:creationId xmlns:a16="http://schemas.microsoft.com/office/drawing/2014/main" id="{1CB7C8E8-0B2D-48EA-B38A-8824335022AB}"/>
-              </a:ext>
-            </a:extLst>
-          </p:cNvPr>
-          <p:cNvPicPr>
-            <a:picLocks noGrp="1" noChangeAspect="1"/>
-          </p:cNvPicPr>
-          <p:nvPr>
-            <p:ph type="pic" sz="quarter" idx="38"/>
-          </p:nvPr>
-        </p:nvPicPr>
-        <p:blipFill>
-          <a:blip r:embed="rId4">
-            <a:extLst>
-              <a:ext uri="{28A0092B-C50C-407E-A947-70E740481C1C}">
-                <a14:useLocalDpi xmlns:a14="http://schemas.microsoft.com/office/drawing/2010/main"/>
-              </a:ext>
-            </a:extLst>
-          </a:blip>
-          <a:stretch>
-            <a:fillRect/>
-          </a:stretch>
-        </p:blipFill>
-        <p:spPr>
-          <a:xfrm>
-            <a:off x="8533512" y="2319681"/>
-            <a:ext cx="1352367" cy="1352367"/>
-          </a:xfrm>
-        </p:spPr>
-      </p:pic>
-      <p:sp>
-        <p:nvSpPr>
-          <p:cNvPr id="15" name="Text Placeholder 14">
-            <a:extLst>
-              <a:ext uri="{FF2B5EF4-FFF2-40B4-BE49-F238E27FC236}">
-                <a16:creationId xmlns:a16="http://schemas.microsoft.com/office/drawing/2014/main" id="{7703A7B9-2572-4305-BA72-39B4336FCD31}"/>
-              </a:ext>
-            </a:extLst>
-          </p:cNvPr>
-          <p:cNvSpPr>
-            <a:spLocks noGrp="1"/>
-          </p:cNvSpPr>
-          <p:nvPr>
-            <p:ph type="body" sz="quarter" idx="39"/>
-          </p:nvPr>
-        </p:nvSpPr>
-        <p:spPr/>
-        <p:txBody>
-          <a:bodyPr/>
-          <a:lstStyle/>
-          <a:p>
-            <a:r>
-              <a:rPr lang="en-US" noProof="1"/>
-              <a:t>Angelica Astrom</a:t>
-            </a:r>
-          </a:p>
-        </p:txBody>
-      </p:sp>
-      <p:sp>
-        <p:nvSpPr>
-          <p:cNvPr id="17" name="Text Placeholder 16">
-            <a:extLst>
-              <a:ext uri="{FF2B5EF4-FFF2-40B4-BE49-F238E27FC236}">
-                <a16:creationId xmlns:a16="http://schemas.microsoft.com/office/drawing/2014/main" id="{2A7E314C-86D5-44F5-8659-DA2501E7C6B8}"/>
-              </a:ext>
-            </a:extLst>
-          </p:cNvPr>
-          <p:cNvSpPr>
-            <a:spLocks noGrp="1"/>
-          </p:cNvSpPr>
-          <p:nvPr>
-            <p:ph type="body" sz="quarter" idx="41"/>
-          </p:nvPr>
-        </p:nvSpPr>
-        <p:spPr/>
-        <p:txBody>
-          <a:bodyPr/>
-          <a:lstStyle/>
-          <a:p>
-            <a:r>
-              <a:rPr lang="en-US" dirty="0"/>
-              <a:t>CFO</a:t>
-            </a:r>
-          </a:p>
-        </p:txBody>
-      </p:sp>
-      <p:sp>
-        <p:nvSpPr>
-          <p:cNvPr id="16" name="Text Placeholder 15">
-            <a:extLst>
-              <a:ext uri="{FF2B5EF4-FFF2-40B4-BE49-F238E27FC236}">
-                <a16:creationId xmlns:a16="http://schemas.microsoft.com/office/drawing/2014/main" id="{2E37AB88-81A1-49DC-9D09-F9E5B658A017}"/>
-              </a:ext>
-            </a:extLst>
-          </p:cNvPr>
-          <p:cNvSpPr>
-            <a:spLocks noGrp="1"/>
-          </p:cNvSpPr>
-          <p:nvPr>
-            <p:ph type="body" sz="quarter" idx="40"/>
-          </p:nvPr>
-        </p:nvSpPr>
-        <p:spPr/>
-        <p:txBody>
-          <a:bodyPr/>
-          <a:lstStyle/>
-          <a:p>
-            <a:r>
-              <a:rPr lang="en-US" dirty="0"/>
-              <a:t>Lorem </a:t>
-            </a:r>
-            <a:r>
-              <a:rPr lang="en-US" noProof="1"/>
-              <a:t>ipsum dolor sit amet, consectetur adipiscing elit. Etiam aliquet eu mi quis lacinia. Ut fermentum a magna ut eleifend. Integer convallis suscipit ante eu varius. </a:t>
-            </a:r>
-          </a:p>
-        </p:txBody>
-      </p:sp>
-      <p:sp>
-        <p:nvSpPr>
-          <p:cNvPr id="3" name="Footer Placeholder 2">
-            <a:extLst>
-              <a:ext uri="{FF2B5EF4-FFF2-40B4-BE49-F238E27FC236}">
-                <a16:creationId xmlns:a16="http://schemas.microsoft.com/office/drawing/2014/main" id="{8C436714-A103-4874-ABDB-6133C91C9E0E}"/>
-              </a:ext>
-            </a:extLst>
-          </p:cNvPr>
-          <p:cNvSpPr>
-            <a:spLocks noGrp="1"/>
-          </p:cNvSpPr>
-          <p:nvPr>
-            <p:ph type="ftr" sz="quarter" idx="10"/>
-          </p:nvPr>
-        </p:nvSpPr>
-        <p:spPr/>
-        <p:txBody>
-          <a:bodyPr/>
-          <a:lstStyle/>
-          <a:p>
-            <a:r>
-              <a:rPr lang="en-US" dirty="0"/>
-              <a:t>Add a footer</a:t>
-            </a:r>
-          </a:p>
-        </p:txBody>
-      </p:sp>
-      <p:sp>
-        <p:nvSpPr>
-          <p:cNvPr id="4" name="Slide Number Placeholder 3">
-            <a:extLst>
-              <a:ext uri="{FF2B5EF4-FFF2-40B4-BE49-F238E27FC236}">
-                <a16:creationId xmlns:a16="http://schemas.microsoft.com/office/drawing/2014/main" id="{4D6C5279-C636-4D97-8B89-DAC480104F75}"/>
-              </a:ext>
-            </a:extLst>
-          </p:cNvPr>
-          <p:cNvSpPr>
-            <a:spLocks noGrp="1"/>
-          </p:cNvSpPr>
-          <p:nvPr>
-            <p:ph type="sldNum" sz="quarter" idx="11"/>
-          </p:nvPr>
-        </p:nvSpPr>
-        <p:spPr/>
-        <p:txBody>
-          <a:bodyPr/>
-          <a:lstStyle/>
-          <a:p>
-            <a:fld id="{19B51A1E-902D-48AF-9020-955120F399B6}" type="slidenum">
-              <a:rPr lang="en-US" smtClean="0"/>
-              <a:pPr/>
-              <a:t>18</a:t>
-            </a:fld>
-            <a:endParaRPr lang="en-US" dirty="0"/>
-          </a:p>
-        </p:txBody>
-      </p:sp>
-    </p:spTree>
-    <p:extLst>
-      <p:ext uri="{BB962C8B-B14F-4D97-AF65-F5344CB8AC3E}">
-        <p14:creationId xmlns:p14="http://schemas.microsoft.com/office/powerpoint/2010/main" val="167904717"/>
-      </p:ext>
-    </p:extLst>
-  </p:cSld>
-  <p:clrMapOvr>
-    <a:masterClrMapping/>
-  </p:clrMapOvr>
-</p:sld>
-</file>
-
-<file path=ppt/slides/slide19.xml><?xml version="1.0" encoding="utf-8"?>
-<p:sld xmlns:a="http://schemas.openxmlformats.org/drawingml/2006/main" xmlns:r="http://schemas.openxmlformats.org/officeDocument/2006/relationships" xmlns:p="http://schemas.openxmlformats.org/presentationml/2006/main">
-  <p:cSld>
-    <p:spTree>
-      <p:nvGrpSpPr>
-        <p:cNvPr id="1" name=""/>
-        <p:cNvGrpSpPr/>
-        <p:nvPr/>
-      </p:nvGrpSpPr>
-      <p:grpSpPr>
-        <a:xfrm>
-          <a:off x="0" y="0"/>
-          <a:ext cx="0" cy="0"/>
-          <a:chOff x="0" y="0"/>
-          <a:chExt cx="0" cy="0"/>
-        </a:xfrm>
-      </p:grpSpPr>
-      <p:sp>
-        <p:nvSpPr>
-          <p:cNvPr id="2" name="Title 1">
-            <a:extLst>
-              <a:ext uri="{FF2B5EF4-FFF2-40B4-BE49-F238E27FC236}">
                 <a16:creationId xmlns:a16="http://schemas.microsoft.com/office/drawing/2014/main" id="{5DCDA18D-5A43-4021-8549-97091BA13D7D}"/>
               </a:ext>
             </a:extLst>
@@ -39071,7 +38714,7 @@
             <a:fld id="{19B51A1E-902D-48AF-9020-955120F399B6}" type="slidenum">
               <a:rPr lang="en-US" smtClean="0"/>
               <a:pPr/>
-              <a:t>19</a:t>
+              <a:t>18</a:t>
             </a:fld>
             <a:endParaRPr lang="en-US" dirty="0"/>
           </a:p>
@@ -39090,615 +38733,7 @@
 </p:sld>
 </file>
 
-<file path=ppt/slides/slide2.xml><?xml version="1.0" encoding="utf-8"?>
-<p:sld xmlns:a="http://schemas.openxmlformats.org/drawingml/2006/main" xmlns:r="http://schemas.openxmlformats.org/officeDocument/2006/relationships" xmlns:p="http://schemas.openxmlformats.org/presentationml/2006/main">
-  <p:cSld>
-    <p:spTree>
-      <p:nvGrpSpPr>
-        <p:cNvPr id="1" name=""/>
-        <p:cNvGrpSpPr/>
-        <p:nvPr/>
-      </p:nvGrpSpPr>
-      <p:grpSpPr>
-        <a:xfrm>
-          <a:off x="0" y="0"/>
-          <a:ext cx="0" cy="0"/>
-          <a:chOff x="0" y="0"/>
-          <a:chExt cx="0" cy="0"/>
-        </a:xfrm>
-      </p:grpSpPr>
-      <p:pic>
-        <p:nvPicPr>
-          <p:cNvPr id="40" name="Picture Placeholder 39" descr="Triangular design of building up close">
-            <a:extLst>
-              <a:ext uri="{FF2B5EF4-FFF2-40B4-BE49-F238E27FC236}">
-                <a16:creationId xmlns:a16="http://schemas.microsoft.com/office/drawing/2014/main" id="{2EC3AED0-517E-41C1-9ECD-ABB0A850496D}"/>
-              </a:ext>
-            </a:extLst>
-          </p:cNvPr>
-          <p:cNvPicPr>
-            <a:picLocks noGrp="1" noChangeAspect="1"/>
-          </p:cNvPicPr>
-          <p:nvPr>
-            <p:ph type="pic" sz="quarter" idx="13"/>
-          </p:nvPr>
-        </p:nvPicPr>
-        <p:blipFill>
-          <a:blip r:embed="rId2" cstate="screen">
-            <a:extLst>
-              <a:ext uri="{28A0092B-C50C-407E-A947-70E740481C1C}">
-                <a14:useLocalDpi xmlns:a14="http://schemas.microsoft.com/office/drawing/2010/main"/>
-              </a:ext>
-            </a:extLst>
-          </a:blip>
-          <a:srcRect/>
-          <a:stretch>
-            <a:fillRect/>
-          </a:stretch>
-        </p:blipFill>
-        <p:spPr/>
-      </p:pic>
-      <p:sp>
-        <p:nvSpPr>
-          <p:cNvPr id="22" name="Title 21">
-            <a:extLst>
-              <a:ext uri="{FF2B5EF4-FFF2-40B4-BE49-F238E27FC236}">
-                <a16:creationId xmlns:a16="http://schemas.microsoft.com/office/drawing/2014/main" id="{BA160141-042F-4099-856C-C1D62E0FF551}"/>
-              </a:ext>
-            </a:extLst>
-          </p:cNvPr>
-          <p:cNvSpPr>
-            <a:spLocks noGrp="1"/>
-          </p:cNvSpPr>
-          <p:nvPr>
-            <p:ph type="ctrTitle"/>
-          </p:nvPr>
-        </p:nvSpPr>
-        <p:spPr/>
-        <p:txBody>
-          <a:bodyPr/>
-          <a:lstStyle/>
-          <a:p>
-            <a:r>
-              <a:rPr lang="en-US" dirty="0"/>
-              <a:t>Presentation</a:t>
-            </a:r>
-            <a:br>
-              <a:rPr lang="en-US" dirty="0"/>
-            </a:br>
-            <a:r>
-              <a:rPr lang="en-US" dirty="0"/>
-              <a:t>Title 2</a:t>
-            </a:r>
-          </a:p>
-        </p:txBody>
-      </p:sp>
-      <p:sp>
-        <p:nvSpPr>
-          <p:cNvPr id="23" name="Subtitle 22">
-            <a:extLst>
-              <a:ext uri="{FF2B5EF4-FFF2-40B4-BE49-F238E27FC236}">
-                <a16:creationId xmlns:a16="http://schemas.microsoft.com/office/drawing/2014/main" id="{212BE0C8-3274-44C1-93C2-9347988BD0FF}"/>
-              </a:ext>
-            </a:extLst>
-          </p:cNvPr>
-          <p:cNvSpPr>
-            <a:spLocks noGrp="1"/>
-          </p:cNvSpPr>
-          <p:nvPr>
-            <p:ph type="subTitle" idx="1"/>
-          </p:nvPr>
-        </p:nvSpPr>
-        <p:spPr/>
-        <p:txBody>
-          <a:bodyPr/>
-          <a:lstStyle/>
-          <a:p>
-            <a:r>
-              <a:rPr lang="en-US" dirty="0"/>
-              <a:t>Lorem </a:t>
-            </a:r>
-            <a:r>
-              <a:rPr lang="en-US" noProof="1"/>
-              <a:t>ipsum dolor sit amet, consectetur adipiscing elit.</a:t>
-            </a:r>
-          </a:p>
-        </p:txBody>
-      </p:sp>
-      <p:pic>
-        <p:nvPicPr>
-          <p:cNvPr id="32" name="Picture Placeholder 31" descr="Long wooden tunnel">
-            <a:extLst>
-              <a:ext uri="{FF2B5EF4-FFF2-40B4-BE49-F238E27FC236}">
-                <a16:creationId xmlns:a16="http://schemas.microsoft.com/office/drawing/2014/main" id="{ADA7147C-9048-4CCD-A9FA-54C09406C1E2}"/>
-              </a:ext>
-            </a:extLst>
-          </p:cNvPr>
-          <p:cNvPicPr>
-            <a:picLocks noGrp="1" noChangeAspect="1"/>
-          </p:cNvPicPr>
-          <p:nvPr>
-            <p:ph type="pic" sz="quarter" idx="14"/>
-          </p:nvPr>
-        </p:nvPicPr>
-        <p:blipFill>
-          <a:blip r:embed="rId3" cstate="screen">
-            <a:extLst>
-              <a:ext uri="{28A0092B-C50C-407E-A947-70E740481C1C}">
-                <a14:useLocalDpi xmlns:a14="http://schemas.microsoft.com/office/drawing/2010/main"/>
-              </a:ext>
-            </a:extLst>
-          </a:blip>
-          <a:srcRect/>
-          <a:stretch>
-            <a:fillRect/>
-          </a:stretch>
-        </p:blipFill>
-        <p:spPr/>
-      </p:pic>
-      <p:sp>
-        <p:nvSpPr>
-          <p:cNvPr id="7" name="Rectangle 6">
-            <a:extLst>
-              <a:ext uri="{FF2B5EF4-FFF2-40B4-BE49-F238E27FC236}">
-                <a16:creationId xmlns:a16="http://schemas.microsoft.com/office/drawing/2014/main" id="{432C84AD-44F1-45D1-9F68-3FDC756E5C73}"/>
-              </a:ext>
-              <a:ext uri="{C183D7F6-B498-43B3-948B-1728B52AA6E4}">
-                <adec:decorative xmlns:adec="http://schemas.microsoft.com/office/drawing/2017/decorative" val="1"/>
-              </a:ext>
-            </a:extLst>
-          </p:cNvPr>
-          <p:cNvSpPr/>
-          <p:nvPr/>
-        </p:nvSpPr>
-        <p:spPr>
-          <a:xfrm>
-            <a:off x="408650" y="3386488"/>
-            <a:ext cx="4330700" cy="182434"/>
-          </a:xfrm>
-          <a:custGeom>
-            <a:avLst/>
-            <a:gdLst>
-              <a:gd name="connsiteX0" fmla="*/ 0 w 4330700"/>
-              <a:gd name="connsiteY0" fmla="*/ 0 h 588834"/>
-              <a:gd name="connsiteX1" fmla="*/ 4330700 w 4330700"/>
-              <a:gd name="connsiteY1" fmla="*/ 0 h 588834"/>
-              <a:gd name="connsiteX2" fmla="*/ 4330700 w 4330700"/>
-              <a:gd name="connsiteY2" fmla="*/ 588834 h 588834"/>
-              <a:gd name="connsiteX3" fmla="*/ 0 w 4330700"/>
-              <a:gd name="connsiteY3" fmla="*/ 588834 h 588834"/>
-              <a:gd name="connsiteX4" fmla="*/ 0 w 4330700"/>
-              <a:gd name="connsiteY4" fmla="*/ 0 h 588834"/>
-              <a:gd name="connsiteX0" fmla="*/ 4330700 w 4422140"/>
-              <a:gd name="connsiteY0" fmla="*/ 0 h 588834"/>
-              <a:gd name="connsiteX1" fmla="*/ 4330700 w 4422140"/>
-              <a:gd name="connsiteY1" fmla="*/ 588834 h 588834"/>
-              <a:gd name="connsiteX2" fmla="*/ 0 w 4422140"/>
-              <a:gd name="connsiteY2" fmla="*/ 588834 h 588834"/>
-              <a:gd name="connsiteX3" fmla="*/ 0 w 4422140"/>
-              <a:gd name="connsiteY3" fmla="*/ 0 h 588834"/>
-              <a:gd name="connsiteX4" fmla="*/ 4422140 w 4422140"/>
-              <a:gd name="connsiteY4" fmla="*/ 91440 h 588834"/>
-              <a:gd name="connsiteX0" fmla="*/ 4330700 w 4330700"/>
-              <a:gd name="connsiteY0" fmla="*/ 0 h 588834"/>
-              <a:gd name="connsiteX1" fmla="*/ 4330700 w 4330700"/>
-              <a:gd name="connsiteY1" fmla="*/ 588834 h 588834"/>
-              <a:gd name="connsiteX2" fmla="*/ 0 w 4330700"/>
-              <a:gd name="connsiteY2" fmla="*/ 588834 h 588834"/>
-              <a:gd name="connsiteX3" fmla="*/ 0 w 4330700"/>
-              <a:gd name="connsiteY3" fmla="*/ 0 h 588834"/>
-            </a:gdLst>
-            <a:ahLst/>
-            <a:cxnLst>
-              <a:cxn ang="0">
-                <a:pos x="connsiteX0" y="connsiteY0"/>
-              </a:cxn>
-              <a:cxn ang="0">
-                <a:pos x="connsiteX1" y="connsiteY1"/>
-              </a:cxn>
-              <a:cxn ang="0">
-                <a:pos x="connsiteX2" y="connsiteY2"/>
-              </a:cxn>
-              <a:cxn ang="0">
-                <a:pos x="connsiteX3" y="connsiteY3"/>
-              </a:cxn>
-            </a:cxnLst>
-            <a:rect l="l" t="t" r="r" b="b"/>
-            <a:pathLst>
-              <a:path w="4330700" h="588834">
-                <a:moveTo>
-                  <a:pt x="4330700" y="0"/>
-                </a:moveTo>
-                <a:lnTo>
-                  <a:pt x="4330700" y="588834"/>
-                </a:lnTo>
-                <a:lnTo>
-                  <a:pt x="0" y="588834"/>
-                </a:lnTo>
-                <a:lnTo>
-                  <a:pt x="0" y="0"/>
-                </a:lnTo>
-              </a:path>
-            </a:pathLst>
-          </a:custGeom>
-          <a:noFill/>
-          <a:ln>
-            <a:solidFill>
-              <a:schemeClr val="bg1">
-                <a:lumMod val="85000"/>
-              </a:schemeClr>
-            </a:solidFill>
-          </a:ln>
-        </p:spPr>
-        <p:style>
-          <a:lnRef idx="2">
-            <a:schemeClr val="accent1">
-              <a:shade val="50000"/>
-            </a:schemeClr>
-          </a:lnRef>
-          <a:fillRef idx="1">
-            <a:schemeClr val="accent1"/>
-          </a:fillRef>
-          <a:effectRef idx="0">
-            <a:schemeClr val="accent1"/>
-          </a:effectRef>
-          <a:fontRef idx="minor">
-            <a:schemeClr val="lt1"/>
-          </a:fontRef>
-        </p:style>
-        <p:txBody>
-          <a:bodyPr rtlCol="0" anchor="ctr"/>
-          <a:lstStyle/>
-          <a:p>
-            <a:pPr algn="ctr"/>
-            <a:endParaRPr lang="en-US" dirty="0"/>
-          </a:p>
-        </p:txBody>
-      </p:sp>
-      <p:sp>
-        <p:nvSpPr>
-          <p:cNvPr id="17" name="Rectangle 6">
-            <a:extLst>
-              <a:ext uri="{FF2B5EF4-FFF2-40B4-BE49-F238E27FC236}">
-                <a16:creationId xmlns:a16="http://schemas.microsoft.com/office/drawing/2014/main" id="{8442E937-7F5A-4CF2-98BD-C9CF5F2B4DDE}"/>
-              </a:ext>
-              <a:ext uri="{C183D7F6-B498-43B3-948B-1728B52AA6E4}">
-                <adec:decorative xmlns:adec="http://schemas.microsoft.com/office/drawing/2017/decorative" val="1"/>
-              </a:ext>
-            </a:extLst>
-          </p:cNvPr>
-          <p:cNvSpPr/>
-          <p:nvPr/>
-        </p:nvSpPr>
-        <p:spPr>
-          <a:xfrm flipV="1">
-            <a:off x="408650" y="404285"/>
-            <a:ext cx="4330700" cy="182434"/>
-          </a:xfrm>
-          <a:custGeom>
-            <a:avLst/>
-            <a:gdLst>
-              <a:gd name="connsiteX0" fmla="*/ 0 w 4330700"/>
-              <a:gd name="connsiteY0" fmla="*/ 0 h 588834"/>
-              <a:gd name="connsiteX1" fmla="*/ 4330700 w 4330700"/>
-              <a:gd name="connsiteY1" fmla="*/ 0 h 588834"/>
-              <a:gd name="connsiteX2" fmla="*/ 4330700 w 4330700"/>
-              <a:gd name="connsiteY2" fmla="*/ 588834 h 588834"/>
-              <a:gd name="connsiteX3" fmla="*/ 0 w 4330700"/>
-              <a:gd name="connsiteY3" fmla="*/ 588834 h 588834"/>
-              <a:gd name="connsiteX4" fmla="*/ 0 w 4330700"/>
-              <a:gd name="connsiteY4" fmla="*/ 0 h 588834"/>
-              <a:gd name="connsiteX0" fmla="*/ 4330700 w 4422140"/>
-              <a:gd name="connsiteY0" fmla="*/ 0 h 588834"/>
-              <a:gd name="connsiteX1" fmla="*/ 4330700 w 4422140"/>
-              <a:gd name="connsiteY1" fmla="*/ 588834 h 588834"/>
-              <a:gd name="connsiteX2" fmla="*/ 0 w 4422140"/>
-              <a:gd name="connsiteY2" fmla="*/ 588834 h 588834"/>
-              <a:gd name="connsiteX3" fmla="*/ 0 w 4422140"/>
-              <a:gd name="connsiteY3" fmla="*/ 0 h 588834"/>
-              <a:gd name="connsiteX4" fmla="*/ 4422140 w 4422140"/>
-              <a:gd name="connsiteY4" fmla="*/ 91440 h 588834"/>
-              <a:gd name="connsiteX0" fmla="*/ 4330700 w 4330700"/>
-              <a:gd name="connsiteY0" fmla="*/ 0 h 588834"/>
-              <a:gd name="connsiteX1" fmla="*/ 4330700 w 4330700"/>
-              <a:gd name="connsiteY1" fmla="*/ 588834 h 588834"/>
-              <a:gd name="connsiteX2" fmla="*/ 0 w 4330700"/>
-              <a:gd name="connsiteY2" fmla="*/ 588834 h 588834"/>
-              <a:gd name="connsiteX3" fmla="*/ 0 w 4330700"/>
-              <a:gd name="connsiteY3" fmla="*/ 0 h 588834"/>
-            </a:gdLst>
-            <a:ahLst/>
-            <a:cxnLst>
-              <a:cxn ang="0">
-                <a:pos x="connsiteX0" y="connsiteY0"/>
-              </a:cxn>
-              <a:cxn ang="0">
-                <a:pos x="connsiteX1" y="connsiteY1"/>
-              </a:cxn>
-              <a:cxn ang="0">
-                <a:pos x="connsiteX2" y="connsiteY2"/>
-              </a:cxn>
-              <a:cxn ang="0">
-                <a:pos x="connsiteX3" y="connsiteY3"/>
-              </a:cxn>
-            </a:cxnLst>
-            <a:rect l="l" t="t" r="r" b="b"/>
-            <a:pathLst>
-              <a:path w="4330700" h="588834">
-                <a:moveTo>
-                  <a:pt x="4330700" y="0"/>
-                </a:moveTo>
-                <a:lnTo>
-                  <a:pt x="4330700" y="588834"/>
-                </a:lnTo>
-                <a:lnTo>
-                  <a:pt x="0" y="588834"/>
-                </a:lnTo>
-                <a:lnTo>
-                  <a:pt x="0" y="0"/>
-                </a:lnTo>
-              </a:path>
-            </a:pathLst>
-          </a:custGeom>
-          <a:noFill/>
-          <a:ln>
-            <a:solidFill>
-              <a:schemeClr val="bg1">
-                <a:lumMod val="85000"/>
-              </a:schemeClr>
-            </a:solidFill>
-          </a:ln>
-        </p:spPr>
-        <p:style>
-          <a:lnRef idx="2">
-            <a:schemeClr val="accent1">
-              <a:shade val="50000"/>
-            </a:schemeClr>
-          </a:lnRef>
-          <a:fillRef idx="1">
-            <a:schemeClr val="accent1"/>
-          </a:fillRef>
-          <a:effectRef idx="0">
-            <a:schemeClr val="accent1"/>
-          </a:effectRef>
-          <a:fontRef idx="minor">
-            <a:schemeClr val="lt1"/>
-          </a:fontRef>
-        </p:style>
-        <p:txBody>
-          <a:bodyPr rtlCol="0" anchor="ctr"/>
-          <a:lstStyle/>
-          <a:p>
-            <a:pPr algn="ctr"/>
-            <a:endParaRPr lang="en-US" dirty="0"/>
-          </a:p>
-        </p:txBody>
-      </p:sp>
-      <p:grpSp>
-        <p:nvGrpSpPr>
-          <p:cNvPr id="9" name="Group 8" descr="Logo Placeholder">
-            <a:extLst>
-              <a:ext uri="{FF2B5EF4-FFF2-40B4-BE49-F238E27FC236}">
-                <a16:creationId xmlns:a16="http://schemas.microsoft.com/office/drawing/2014/main" id="{3F31EBC4-0A2C-402C-AE20-AC3F0C88AF14}"/>
-              </a:ext>
-            </a:extLst>
-          </p:cNvPr>
-          <p:cNvGrpSpPr/>
-          <p:nvPr/>
-        </p:nvGrpSpPr>
-        <p:grpSpPr>
-          <a:xfrm>
-            <a:off x="9874905" y="6067700"/>
-            <a:ext cx="2173095" cy="523220"/>
-            <a:chOff x="1985170" y="1950690"/>
-            <a:chExt cx="2173095" cy="523220"/>
-          </a:xfrm>
-        </p:grpSpPr>
-        <p:sp>
-          <p:nvSpPr>
-            <p:cNvPr id="10" name="Rectangle 9">
-              <a:extLst>
-                <a:ext uri="{FF2B5EF4-FFF2-40B4-BE49-F238E27FC236}">
-                  <a16:creationId xmlns:a16="http://schemas.microsoft.com/office/drawing/2014/main" id="{53F4EED9-3E92-4A9D-8DA8-01DFF623C45D}"/>
-                </a:ext>
-              </a:extLst>
-            </p:cNvPr>
-            <p:cNvSpPr/>
-            <p:nvPr/>
-          </p:nvSpPr>
-          <p:spPr>
-            <a:xfrm>
-              <a:off x="1985170" y="1950690"/>
-              <a:ext cx="2173095" cy="523220"/>
-            </a:xfrm>
-            <a:prstGeom prst="rect">
-              <a:avLst/>
-            </a:prstGeom>
-            <a:solidFill>
-              <a:schemeClr val="tx1"/>
-            </a:solidFill>
-          </p:spPr>
-          <p:txBody>
-            <a:bodyPr wrap="none" anchor="ctr">
-              <a:noAutofit/>
-            </a:bodyPr>
-            <a:lstStyle/>
-            <a:p>
-              <a:pPr algn="ctr"/>
-              <a:r>
-                <a:rPr lang="en-US" sz="2000" b="1" dirty="0">
-                  <a:solidFill>
-                    <a:schemeClr val="bg1"/>
-                  </a:solidFill>
-                  <a:latin typeface="+mj-lt"/>
-                </a:rPr>
-                <a:t>Contoso</a:t>
-              </a:r>
-              <a:r>
-                <a:rPr lang="en-US" sz="2000" dirty="0">
-                  <a:solidFill>
-                    <a:schemeClr val="bg1"/>
-                  </a:solidFill>
-                  <a:latin typeface="+mj-lt"/>
-                </a:rPr>
-                <a:t> </a:t>
-              </a:r>
-              <a:r>
-                <a:rPr lang="en-US" sz="2000" i="1" dirty="0">
-                  <a:solidFill>
-                    <a:schemeClr val="bg1"/>
-                  </a:solidFill>
-                  <a:latin typeface="+mj-lt"/>
-                </a:rPr>
-                <a:t>Ltd</a:t>
-              </a:r>
-              <a:r>
-                <a:rPr lang="en-US" sz="2000" dirty="0">
-                  <a:solidFill>
-                    <a:schemeClr val="bg1"/>
-                  </a:solidFill>
-                  <a:latin typeface="+mj-lt"/>
-                </a:rPr>
-                <a:t>.</a:t>
-              </a:r>
-            </a:p>
-          </p:txBody>
-        </p:sp>
-        <p:sp>
-          <p:nvSpPr>
-            <p:cNvPr id="11" name="Rectangle 6">
-              <a:extLst>
-                <a:ext uri="{FF2B5EF4-FFF2-40B4-BE49-F238E27FC236}">
-                  <a16:creationId xmlns:a16="http://schemas.microsoft.com/office/drawing/2014/main" id="{932EEAB5-EC39-4A1C-9DB2-86C49079560B}"/>
-                </a:ext>
-              </a:extLst>
-            </p:cNvPr>
-            <p:cNvSpPr/>
-            <p:nvPr/>
-          </p:nvSpPr>
-          <p:spPr>
-            <a:xfrm flipV="1">
-              <a:off x="2087087" y="2034539"/>
-              <a:ext cx="203115" cy="177761"/>
-            </a:xfrm>
-            <a:custGeom>
-              <a:avLst/>
-              <a:gdLst>
-                <a:gd name="connsiteX0" fmla="*/ 0 w 4330700"/>
-                <a:gd name="connsiteY0" fmla="*/ 0 h 588834"/>
-                <a:gd name="connsiteX1" fmla="*/ 4330700 w 4330700"/>
-                <a:gd name="connsiteY1" fmla="*/ 0 h 588834"/>
-                <a:gd name="connsiteX2" fmla="*/ 4330700 w 4330700"/>
-                <a:gd name="connsiteY2" fmla="*/ 588834 h 588834"/>
-                <a:gd name="connsiteX3" fmla="*/ 0 w 4330700"/>
-                <a:gd name="connsiteY3" fmla="*/ 588834 h 588834"/>
-                <a:gd name="connsiteX4" fmla="*/ 0 w 4330700"/>
-                <a:gd name="connsiteY4" fmla="*/ 0 h 588834"/>
-                <a:gd name="connsiteX0" fmla="*/ 4330700 w 4422140"/>
-                <a:gd name="connsiteY0" fmla="*/ 0 h 588834"/>
-                <a:gd name="connsiteX1" fmla="*/ 4330700 w 4422140"/>
-                <a:gd name="connsiteY1" fmla="*/ 588834 h 588834"/>
-                <a:gd name="connsiteX2" fmla="*/ 0 w 4422140"/>
-                <a:gd name="connsiteY2" fmla="*/ 588834 h 588834"/>
-                <a:gd name="connsiteX3" fmla="*/ 0 w 4422140"/>
-                <a:gd name="connsiteY3" fmla="*/ 0 h 588834"/>
-                <a:gd name="connsiteX4" fmla="*/ 4422140 w 4422140"/>
-                <a:gd name="connsiteY4" fmla="*/ 91440 h 588834"/>
-                <a:gd name="connsiteX0" fmla="*/ 4330700 w 4330700"/>
-                <a:gd name="connsiteY0" fmla="*/ 0 h 588834"/>
-                <a:gd name="connsiteX1" fmla="*/ 4330700 w 4330700"/>
-                <a:gd name="connsiteY1" fmla="*/ 588834 h 588834"/>
-                <a:gd name="connsiteX2" fmla="*/ 0 w 4330700"/>
-                <a:gd name="connsiteY2" fmla="*/ 588834 h 588834"/>
-                <a:gd name="connsiteX3" fmla="*/ 0 w 4330700"/>
-                <a:gd name="connsiteY3" fmla="*/ 0 h 588834"/>
-                <a:gd name="connsiteX0" fmla="*/ 4330700 w 4330700"/>
-                <a:gd name="connsiteY0" fmla="*/ 588834 h 588834"/>
-                <a:gd name="connsiteX1" fmla="*/ 0 w 4330700"/>
-                <a:gd name="connsiteY1" fmla="*/ 588834 h 588834"/>
-                <a:gd name="connsiteX2" fmla="*/ 0 w 4330700"/>
-                <a:gd name="connsiteY2" fmla="*/ 0 h 588834"/>
-                <a:gd name="connsiteX0" fmla="*/ 550806 w 550806"/>
-                <a:gd name="connsiteY0" fmla="*/ 588834 h 588834"/>
-                <a:gd name="connsiteX1" fmla="*/ 0 w 550806"/>
-                <a:gd name="connsiteY1" fmla="*/ 588834 h 588834"/>
-                <a:gd name="connsiteX2" fmla="*/ 0 w 550806"/>
-                <a:gd name="connsiteY2" fmla="*/ 0 h 588834"/>
-              </a:gdLst>
-              <a:ahLst/>
-              <a:cxnLst>
-                <a:cxn ang="0">
-                  <a:pos x="connsiteX0" y="connsiteY0"/>
-                </a:cxn>
-                <a:cxn ang="0">
-                  <a:pos x="connsiteX1" y="connsiteY1"/>
-                </a:cxn>
-                <a:cxn ang="0">
-                  <a:pos x="connsiteX2" y="connsiteY2"/>
-                </a:cxn>
-              </a:cxnLst>
-              <a:rect l="l" t="t" r="r" b="b"/>
-              <a:pathLst>
-                <a:path w="550806" h="588834">
-                  <a:moveTo>
-                    <a:pt x="550806" y="588834"/>
-                  </a:moveTo>
-                  <a:lnTo>
-                    <a:pt x="0" y="588834"/>
-                  </a:lnTo>
-                  <a:lnTo>
-                    <a:pt x="0" y="0"/>
-                  </a:lnTo>
-                </a:path>
-              </a:pathLst>
-            </a:custGeom>
-            <a:noFill/>
-            <a:ln w="25400">
-              <a:solidFill>
-                <a:schemeClr val="bg1"/>
-              </a:solidFill>
-            </a:ln>
-          </p:spPr>
-          <p:style>
-            <a:lnRef idx="2">
-              <a:schemeClr val="accent1">
-                <a:shade val="50000"/>
-              </a:schemeClr>
-            </a:lnRef>
-            <a:fillRef idx="1">
-              <a:schemeClr val="accent1"/>
-            </a:fillRef>
-            <a:effectRef idx="0">
-              <a:schemeClr val="accent1"/>
-            </a:effectRef>
-            <a:fontRef idx="minor">
-              <a:schemeClr val="lt1"/>
-            </a:fontRef>
-          </p:style>
-          <p:txBody>
-            <a:bodyPr rtlCol="0" anchor="ctr"/>
-            <a:lstStyle/>
-            <a:p>
-              <a:pPr algn="ctr"/>
-              <a:endParaRPr lang="en-US" dirty="0"/>
-            </a:p>
-          </p:txBody>
-        </p:sp>
-      </p:grpSp>
-    </p:spTree>
-    <p:extLst>
-      <p:ext uri="{BB962C8B-B14F-4D97-AF65-F5344CB8AC3E}">
-        <p14:creationId xmlns:p14="http://schemas.microsoft.com/office/powerpoint/2010/main" val="1196619254"/>
-      </p:ext>
-    </p:extLst>
-  </p:cSld>
-  <p:clrMapOvr>
-    <a:masterClrMapping/>
-  </p:clrMapOvr>
-</p:sld>
-</file>
-
-<file path=ppt/slides/slide20.xml><?xml version="1.0" encoding="utf-8"?>
+<file path=ppt/slides/slide19.xml><?xml version="1.0" encoding="utf-8"?>
 <p:sld xmlns:a="http://schemas.openxmlformats.org/drawingml/2006/main" xmlns:r="http://schemas.openxmlformats.org/officeDocument/2006/relationships" xmlns:p="http://schemas.openxmlformats.org/presentationml/2006/main">
   <p:cSld>
     <p:spTree>
@@ -42341,7 +41376,7 @@
             <a:fld id="{19B51A1E-902D-48AF-9020-955120F399B6}" type="slidenum">
               <a:rPr lang="en-US" smtClean="0"/>
               <a:pPr/>
-              <a:t>20</a:t>
+              <a:t>19</a:t>
             </a:fld>
             <a:endParaRPr lang="en-US" dirty="0"/>
           </a:p>
@@ -42360,7 +41395,7 @@
 </p:sld>
 </file>
 
-<file path=ppt/slides/slide21.xml><?xml version="1.0" encoding="utf-8"?>
+<file path=ppt/slides/slide2.xml><?xml version="1.0" encoding="utf-8"?>
 <p:sld xmlns:a="http://schemas.openxmlformats.org/drawingml/2006/main" xmlns:r="http://schemas.openxmlformats.org/officeDocument/2006/relationships" xmlns:p="http://schemas.openxmlformats.org/presentationml/2006/main">
   <p:cSld>
     <p:spTree>
@@ -42379,10 +41414,10 @@
       </p:grpSpPr>
       <p:sp>
         <p:nvSpPr>
-          <p:cNvPr id="8" name="Text Placeholder 7">
-            <a:extLst>
-              <a:ext uri="{FF2B5EF4-FFF2-40B4-BE49-F238E27FC236}">
-                <a16:creationId xmlns:a16="http://schemas.microsoft.com/office/drawing/2014/main" id="{937AF956-2A90-4422-A3C2-A6109BD133BA}"/>
+          <p:cNvPr id="6" name="Content Placeholder 5">
+            <a:extLst>
+              <a:ext uri="{FF2B5EF4-FFF2-40B4-BE49-F238E27FC236}">
+                <a16:creationId xmlns:a16="http://schemas.microsoft.com/office/drawing/2014/main" id="{9365D194-85BA-4D50-B47D-062E79220FE0}"/>
               </a:ext>
             </a:extLst>
           </p:cNvPr>
@@ -42390,38 +41425,77 @@
             <a:spLocks noGrp="1"/>
           </p:cNvSpPr>
           <p:nvPr>
-            <p:ph type="body" sz="quarter" idx="18"/>
+            <p:ph idx="4294967295"/>
           </p:nvPr>
         </p:nvSpPr>
         <p:spPr>
           <a:xfrm>
-            <a:off x="424800" y="3327399"/>
-            <a:ext cx="5468000" cy="2032001"/>
+            <a:off x="424370" y="2905536"/>
+            <a:ext cx="5959013" cy="2954241"/>
           </a:xfrm>
         </p:spPr>
         <p:txBody>
           <a:bodyPr/>
           <a:lstStyle/>
           <a:p>
-            <a:r>
-              <a:rPr lang="en-US" dirty="0"/>
+            <a:pPr marL="0" indent="0">
+              <a:spcBef>
+                <a:spcPts val="0"/>
+              </a:spcBef>
+              <a:spcAft>
+                <a:spcPts val="1500"/>
+              </a:spcAft>
+              <a:buNone/>
+            </a:pPr>
+            <a:r>
+              <a:rPr lang="en-US" sz="3200" dirty="0"/>
               <a:t>Lorem </a:t>
             </a:r>
             <a:r>
-              <a:rPr lang="en-US" noProof="1"/>
-              <a:t>ipsum dolor sit amet, consectetur adipiscing elit. Etiam aliquet eu mi quis lacinia. </a:t>
-            </a:r>
-          </a:p>
-          <a:p>
+              <a:rPr lang="en-US" sz="3200" noProof="1"/>
+              <a:t>ipsum dolor sit amet, consectetur adipiscing elit. </a:t>
+            </a:r>
+          </a:p>
+          <a:p>
+            <a:pPr>
+              <a:spcBef>
+                <a:spcPts val="0"/>
+              </a:spcBef>
+              <a:spcAft>
+                <a:spcPts val="1500"/>
+              </a:spcAft>
+            </a:pPr>
             <a:r>
               <a:rPr lang="en-US" noProof="1"/>
               <a:t>Ut fermentum a magna ut eleifend. Integer convallis suscipit ante eu varius. </a:t>
             </a:r>
           </a:p>
           <a:p>
+            <a:pPr>
+              <a:spcBef>
+                <a:spcPts val="0"/>
+              </a:spcBef>
+              <a:spcAft>
+                <a:spcPts val="1500"/>
+              </a:spcAft>
+            </a:pPr>
             <a:r>
               <a:rPr lang="en-US" noProof="1"/>
-              <a:t>Morbi a purus dolor. Suspendisse sit amet ipsum finibus justo viverra blandit. Ut congue quis tortor eget sodales. </a:t>
+              <a:t>Morbi a purus dolor. Suspendisse sit amet ipsum finibus justo viverra blandit. </a:t>
+            </a:r>
+          </a:p>
+          <a:p>
+            <a:pPr>
+              <a:spcBef>
+                <a:spcPts val="0"/>
+              </a:spcBef>
+              <a:spcAft>
+                <a:spcPts val="1500"/>
+              </a:spcAft>
+            </a:pPr>
+            <a:r>
+              <a:rPr lang="en-US" noProof="1"/>
+              <a:t>Ut congue quis tortor eget sodales. </a:t>
             </a:r>
           </a:p>
         </p:txBody>
@@ -42431,7 +41505,7 @@
           <p:cNvPr id="2" name="Title 1">
             <a:extLst>
               <a:ext uri="{FF2B5EF4-FFF2-40B4-BE49-F238E27FC236}">
-                <a16:creationId xmlns:a16="http://schemas.microsoft.com/office/drawing/2014/main" id="{63E41472-323F-47B9-8C9E-D3B43CA30C02}"/>
+                <a16:creationId xmlns:a16="http://schemas.microsoft.com/office/drawing/2014/main" id="{6719F29B-F233-48AF-8261-F33A4E079E3E}"/>
               </a:ext>
             </a:extLst>
           </p:cNvPr>
@@ -42449,17 +41523,45 @@
           <a:p>
             <a:r>
               <a:rPr lang="en-US" dirty="0"/>
-              <a:t>Summary</a:t>
+              <a:t>About Us</a:t>
+            </a:r>
+          </a:p>
+        </p:txBody>
+      </p:sp>
+      <p:sp>
+        <p:nvSpPr>
+          <p:cNvPr id="3" name="Subtitle 2">
+            <a:extLst>
+              <a:ext uri="{FF2B5EF4-FFF2-40B4-BE49-F238E27FC236}">
+                <a16:creationId xmlns:a16="http://schemas.microsoft.com/office/drawing/2014/main" id="{35E3EA69-4E0E-41BD-8095-A124225A2647}"/>
+              </a:ext>
+            </a:extLst>
+          </p:cNvPr>
+          <p:cNvSpPr>
+            <a:spLocks noGrp="1"/>
+          </p:cNvSpPr>
+          <p:nvPr>
+            <p:ph type="subTitle" idx="1"/>
+          </p:nvPr>
+        </p:nvSpPr>
+        <p:spPr/>
+        <p:txBody>
+          <a:bodyPr/>
+          <a:lstStyle/>
+          <a:p>
+            <a:r>
+              <a:rPr lang="en-US" dirty="0"/>
+              <a:t>Lorem ipsum dolor sit amet, consectetur adipiscing elit. Etiam aliquet eu mi quis lacinia. Ut fermentum a magna ut.</a:t>
             </a:r>
           </a:p>
         </p:txBody>
       </p:sp>
       <p:pic>
         <p:nvPicPr>
-          <p:cNvPr id="10" name="Picture Placeholder 9" descr="Image of office building windows">
-            <a:extLst>
-              <a:ext uri="{FF2B5EF4-FFF2-40B4-BE49-F238E27FC236}">
-                <a16:creationId xmlns:a16="http://schemas.microsoft.com/office/drawing/2014/main" id="{9663686B-44B2-425C-9F15-899A0641AA7D}"/>
+          <p:cNvPr id="13" name="Picture Placeholder 12" descr="blueprtint drawing of a chair">
+            <a:extLst>
+              <a:ext uri="{FF2B5EF4-FFF2-40B4-BE49-F238E27FC236}">
+                <a16:creationId xmlns:a16="http://schemas.microsoft.com/office/drawing/2014/main" id="{6E643D59-F8F9-4C98-A5EE-B7CC655BB931}"/>
               </a:ext>
             </a:extLst>
           </p:cNvPr>
@@ -42494,7 +41596,7 @@
           <p:cNvPr id="12" name="Picture Placeholder 11" descr="close up image of inside building material">
             <a:extLst>
               <a:ext uri="{FF2B5EF4-FFF2-40B4-BE49-F238E27FC236}">
-                <a16:creationId xmlns:a16="http://schemas.microsoft.com/office/drawing/2014/main" id="{C640A70E-BC90-4E9E-97DF-9D7362FEEC64}"/>
+                <a16:creationId xmlns:a16="http://schemas.microsoft.com/office/drawing/2014/main" id="{538221E8-A1FD-47AB-9710-BF80F25B9D30}"/>
               </a:ext>
             </a:extLst>
           </p:cNvPr>
@@ -42526,6 +41628,475 @@
       </p:pic>
       <p:sp>
         <p:nvSpPr>
+          <p:cNvPr id="9" name="Rectangle 6">
+            <a:extLst>
+              <a:ext uri="{FF2B5EF4-FFF2-40B4-BE49-F238E27FC236}">
+                <a16:creationId xmlns:a16="http://schemas.microsoft.com/office/drawing/2014/main" id="{C9D745AD-2359-4511-AF2E-0CFC0783471A}"/>
+              </a:ext>
+              <a:ext uri="{C183D7F6-B498-43B3-948B-1728B52AA6E4}">
+                <adec:decorative xmlns:adec="http://schemas.microsoft.com/office/drawing/2017/decorative" val="1"/>
+              </a:ext>
+            </a:extLst>
+          </p:cNvPr>
+          <p:cNvSpPr/>
+          <p:nvPr/>
+        </p:nvSpPr>
+        <p:spPr>
+          <a:xfrm>
+            <a:off x="7453850" y="2814319"/>
+            <a:ext cx="4330700" cy="182434"/>
+          </a:xfrm>
+          <a:custGeom>
+            <a:avLst/>
+            <a:gdLst>
+              <a:gd name="connsiteX0" fmla="*/ 0 w 4330700"/>
+              <a:gd name="connsiteY0" fmla="*/ 0 h 588834"/>
+              <a:gd name="connsiteX1" fmla="*/ 4330700 w 4330700"/>
+              <a:gd name="connsiteY1" fmla="*/ 0 h 588834"/>
+              <a:gd name="connsiteX2" fmla="*/ 4330700 w 4330700"/>
+              <a:gd name="connsiteY2" fmla="*/ 588834 h 588834"/>
+              <a:gd name="connsiteX3" fmla="*/ 0 w 4330700"/>
+              <a:gd name="connsiteY3" fmla="*/ 588834 h 588834"/>
+              <a:gd name="connsiteX4" fmla="*/ 0 w 4330700"/>
+              <a:gd name="connsiteY4" fmla="*/ 0 h 588834"/>
+              <a:gd name="connsiteX0" fmla="*/ 4330700 w 4422140"/>
+              <a:gd name="connsiteY0" fmla="*/ 0 h 588834"/>
+              <a:gd name="connsiteX1" fmla="*/ 4330700 w 4422140"/>
+              <a:gd name="connsiteY1" fmla="*/ 588834 h 588834"/>
+              <a:gd name="connsiteX2" fmla="*/ 0 w 4422140"/>
+              <a:gd name="connsiteY2" fmla="*/ 588834 h 588834"/>
+              <a:gd name="connsiteX3" fmla="*/ 0 w 4422140"/>
+              <a:gd name="connsiteY3" fmla="*/ 0 h 588834"/>
+              <a:gd name="connsiteX4" fmla="*/ 4422140 w 4422140"/>
+              <a:gd name="connsiteY4" fmla="*/ 91440 h 588834"/>
+              <a:gd name="connsiteX0" fmla="*/ 4330700 w 4330700"/>
+              <a:gd name="connsiteY0" fmla="*/ 0 h 588834"/>
+              <a:gd name="connsiteX1" fmla="*/ 4330700 w 4330700"/>
+              <a:gd name="connsiteY1" fmla="*/ 588834 h 588834"/>
+              <a:gd name="connsiteX2" fmla="*/ 0 w 4330700"/>
+              <a:gd name="connsiteY2" fmla="*/ 588834 h 588834"/>
+              <a:gd name="connsiteX3" fmla="*/ 0 w 4330700"/>
+              <a:gd name="connsiteY3" fmla="*/ 0 h 588834"/>
+            </a:gdLst>
+            <a:ahLst/>
+            <a:cxnLst>
+              <a:cxn ang="0">
+                <a:pos x="connsiteX0" y="connsiteY0"/>
+              </a:cxn>
+              <a:cxn ang="0">
+                <a:pos x="connsiteX1" y="connsiteY1"/>
+              </a:cxn>
+              <a:cxn ang="0">
+                <a:pos x="connsiteX2" y="connsiteY2"/>
+              </a:cxn>
+              <a:cxn ang="0">
+                <a:pos x="connsiteX3" y="connsiteY3"/>
+              </a:cxn>
+            </a:cxnLst>
+            <a:rect l="l" t="t" r="r" b="b"/>
+            <a:pathLst>
+              <a:path w="4330700" h="588834">
+                <a:moveTo>
+                  <a:pt x="4330700" y="0"/>
+                </a:moveTo>
+                <a:lnTo>
+                  <a:pt x="4330700" y="588834"/>
+                </a:lnTo>
+                <a:lnTo>
+                  <a:pt x="0" y="588834"/>
+                </a:lnTo>
+                <a:lnTo>
+                  <a:pt x="0" y="0"/>
+                </a:lnTo>
+              </a:path>
+            </a:pathLst>
+          </a:custGeom>
+          <a:noFill/>
+          <a:ln>
+            <a:solidFill>
+              <a:schemeClr val="accent1"/>
+            </a:solidFill>
+          </a:ln>
+        </p:spPr>
+        <p:style>
+          <a:lnRef idx="2">
+            <a:schemeClr val="accent1">
+              <a:shade val="50000"/>
+            </a:schemeClr>
+          </a:lnRef>
+          <a:fillRef idx="1">
+            <a:schemeClr val="accent1"/>
+          </a:fillRef>
+          <a:effectRef idx="0">
+            <a:schemeClr val="accent1"/>
+          </a:effectRef>
+          <a:fontRef idx="minor">
+            <a:schemeClr val="lt1"/>
+          </a:fontRef>
+        </p:style>
+        <p:txBody>
+          <a:bodyPr rtlCol="0" anchor="ctr"/>
+          <a:lstStyle/>
+          <a:p>
+            <a:pPr algn="ctr"/>
+            <a:endParaRPr lang="en-US" dirty="0"/>
+          </a:p>
+        </p:txBody>
+      </p:sp>
+      <p:sp>
+        <p:nvSpPr>
+          <p:cNvPr id="10" name="Rectangle 6">
+            <a:extLst>
+              <a:ext uri="{FF2B5EF4-FFF2-40B4-BE49-F238E27FC236}">
+                <a16:creationId xmlns:a16="http://schemas.microsoft.com/office/drawing/2014/main" id="{A0F0B9BF-0637-4907-A537-C5F7C796FCA1}"/>
+              </a:ext>
+              <a:ext uri="{C183D7F6-B498-43B3-948B-1728B52AA6E4}">
+                <adec:decorative xmlns:adec="http://schemas.microsoft.com/office/drawing/2017/decorative" val="1"/>
+              </a:ext>
+            </a:extLst>
+          </p:cNvPr>
+          <p:cNvSpPr/>
+          <p:nvPr/>
+        </p:nvSpPr>
+        <p:spPr>
+          <a:xfrm flipV="1">
+            <a:off x="7453850" y="404285"/>
+            <a:ext cx="4330700" cy="182434"/>
+          </a:xfrm>
+          <a:custGeom>
+            <a:avLst/>
+            <a:gdLst>
+              <a:gd name="connsiteX0" fmla="*/ 0 w 4330700"/>
+              <a:gd name="connsiteY0" fmla="*/ 0 h 588834"/>
+              <a:gd name="connsiteX1" fmla="*/ 4330700 w 4330700"/>
+              <a:gd name="connsiteY1" fmla="*/ 0 h 588834"/>
+              <a:gd name="connsiteX2" fmla="*/ 4330700 w 4330700"/>
+              <a:gd name="connsiteY2" fmla="*/ 588834 h 588834"/>
+              <a:gd name="connsiteX3" fmla="*/ 0 w 4330700"/>
+              <a:gd name="connsiteY3" fmla="*/ 588834 h 588834"/>
+              <a:gd name="connsiteX4" fmla="*/ 0 w 4330700"/>
+              <a:gd name="connsiteY4" fmla="*/ 0 h 588834"/>
+              <a:gd name="connsiteX0" fmla="*/ 4330700 w 4422140"/>
+              <a:gd name="connsiteY0" fmla="*/ 0 h 588834"/>
+              <a:gd name="connsiteX1" fmla="*/ 4330700 w 4422140"/>
+              <a:gd name="connsiteY1" fmla="*/ 588834 h 588834"/>
+              <a:gd name="connsiteX2" fmla="*/ 0 w 4422140"/>
+              <a:gd name="connsiteY2" fmla="*/ 588834 h 588834"/>
+              <a:gd name="connsiteX3" fmla="*/ 0 w 4422140"/>
+              <a:gd name="connsiteY3" fmla="*/ 0 h 588834"/>
+              <a:gd name="connsiteX4" fmla="*/ 4422140 w 4422140"/>
+              <a:gd name="connsiteY4" fmla="*/ 91440 h 588834"/>
+              <a:gd name="connsiteX0" fmla="*/ 4330700 w 4330700"/>
+              <a:gd name="connsiteY0" fmla="*/ 0 h 588834"/>
+              <a:gd name="connsiteX1" fmla="*/ 4330700 w 4330700"/>
+              <a:gd name="connsiteY1" fmla="*/ 588834 h 588834"/>
+              <a:gd name="connsiteX2" fmla="*/ 0 w 4330700"/>
+              <a:gd name="connsiteY2" fmla="*/ 588834 h 588834"/>
+              <a:gd name="connsiteX3" fmla="*/ 0 w 4330700"/>
+              <a:gd name="connsiteY3" fmla="*/ 0 h 588834"/>
+            </a:gdLst>
+            <a:ahLst/>
+            <a:cxnLst>
+              <a:cxn ang="0">
+                <a:pos x="connsiteX0" y="connsiteY0"/>
+              </a:cxn>
+              <a:cxn ang="0">
+                <a:pos x="connsiteX1" y="connsiteY1"/>
+              </a:cxn>
+              <a:cxn ang="0">
+                <a:pos x="connsiteX2" y="connsiteY2"/>
+              </a:cxn>
+              <a:cxn ang="0">
+                <a:pos x="connsiteX3" y="connsiteY3"/>
+              </a:cxn>
+            </a:cxnLst>
+            <a:rect l="l" t="t" r="r" b="b"/>
+            <a:pathLst>
+              <a:path w="4330700" h="588834">
+                <a:moveTo>
+                  <a:pt x="4330700" y="0"/>
+                </a:moveTo>
+                <a:lnTo>
+                  <a:pt x="4330700" y="588834"/>
+                </a:lnTo>
+                <a:lnTo>
+                  <a:pt x="0" y="588834"/>
+                </a:lnTo>
+                <a:lnTo>
+                  <a:pt x="0" y="0"/>
+                </a:lnTo>
+              </a:path>
+            </a:pathLst>
+          </a:custGeom>
+          <a:noFill/>
+          <a:ln>
+            <a:solidFill>
+              <a:schemeClr val="accent1"/>
+            </a:solidFill>
+          </a:ln>
+        </p:spPr>
+        <p:style>
+          <a:lnRef idx="2">
+            <a:schemeClr val="accent1">
+              <a:shade val="50000"/>
+            </a:schemeClr>
+          </a:lnRef>
+          <a:fillRef idx="1">
+            <a:schemeClr val="accent1"/>
+          </a:fillRef>
+          <a:effectRef idx="0">
+            <a:schemeClr val="accent1"/>
+          </a:effectRef>
+          <a:fontRef idx="minor">
+            <a:schemeClr val="lt1"/>
+          </a:fontRef>
+        </p:style>
+        <p:txBody>
+          <a:bodyPr rtlCol="0" anchor="ctr"/>
+          <a:lstStyle/>
+          <a:p>
+            <a:pPr algn="ctr"/>
+            <a:endParaRPr lang="en-US" dirty="0"/>
+          </a:p>
+        </p:txBody>
+      </p:sp>
+      <p:sp>
+        <p:nvSpPr>
+          <p:cNvPr id="5" name="Footer Placeholder 4">
+            <a:extLst>
+              <a:ext uri="{FF2B5EF4-FFF2-40B4-BE49-F238E27FC236}">
+                <a16:creationId xmlns:a16="http://schemas.microsoft.com/office/drawing/2014/main" id="{AF29EA23-F34E-486A-B8B2-0C3019266975}"/>
+              </a:ext>
+            </a:extLst>
+          </p:cNvPr>
+          <p:cNvSpPr>
+            <a:spLocks noGrp="1"/>
+          </p:cNvSpPr>
+          <p:nvPr>
+            <p:ph type="ftr" sz="quarter" idx="12"/>
+          </p:nvPr>
+        </p:nvSpPr>
+        <p:spPr/>
+        <p:txBody>
+          <a:bodyPr/>
+          <a:lstStyle/>
+          <a:p>
+            <a:r>
+              <a:rPr lang="en-US" dirty="0"/>
+              <a:t>Add a footer</a:t>
+            </a:r>
+          </a:p>
+        </p:txBody>
+      </p:sp>
+      <p:sp>
+        <p:nvSpPr>
+          <p:cNvPr id="4" name="Slide Number Placeholder 3">
+            <a:extLst>
+              <a:ext uri="{FF2B5EF4-FFF2-40B4-BE49-F238E27FC236}">
+                <a16:creationId xmlns:a16="http://schemas.microsoft.com/office/drawing/2014/main" id="{328F602C-7F98-4C02-99D4-ED65E00D66A4}"/>
+              </a:ext>
+            </a:extLst>
+          </p:cNvPr>
+          <p:cNvSpPr>
+            <a:spLocks noGrp="1"/>
+          </p:cNvSpPr>
+          <p:nvPr>
+            <p:ph type="sldNum" sz="quarter" idx="11"/>
+          </p:nvPr>
+        </p:nvSpPr>
+        <p:spPr/>
+        <p:txBody>
+          <a:bodyPr/>
+          <a:lstStyle/>
+          <a:p>
+            <a:fld id="{19B51A1E-902D-48AF-9020-955120F399B6}" type="slidenum">
+              <a:rPr lang="en-US" smtClean="0"/>
+              <a:pPr/>
+              <a:t>2</a:t>
+            </a:fld>
+            <a:endParaRPr lang="en-US" dirty="0"/>
+          </a:p>
+        </p:txBody>
+      </p:sp>
+    </p:spTree>
+    <p:extLst>
+      <p:ext uri="{BB962C8B-B14F-4D97-AF65-F5344CB8AC3E}">
+        <p14:creationId xmlns:p14="http://schemas.microsoft.com/office/powerpoint/2010/main" val="2243494996"/>
+      </p:ext>
+    </p:extLst>
+  </p:cSld>
+  <p:clrMapOvr>
+    <a:masterClrMapping/>
+  </p:clrMapOvr>
+</p:sld>
+</file>
+
+<file path=ppt/slides/slide20.xml><?xml version="1.0" encoding="utf-8"?>
+<p:sld xmlns:a="http://schemas.openxmlformats.org/drawingml/2006/main" xmlns:r="http://schemas.openxmlformats.org/officeDocument/2006/relationships" xmlns:p="http://schemas.openxmlformats.org/presentationml/2006/main">
+  <p:cSld>
+    <p:spTree>
+      <p:nvGrpSpPr>
+        <p:cNvPr id="1" name=""/>
+        <p:cNvGrpSpPr/>
+        <p:nvPr/>
+      </p:nvGrpSpPr>
+      <p:grpSpPr>
+        <a:xfrm>
+          <a:off x="0" y="0"/>
+          <a:ext cx="0" cy="0"/>
+          <a:chOff x="0" y="0"/>
+          <a:chExt cx="0" cy="0"/>
+        </a:xfrm>
+      </p:grpSpPr>
+      <p:sp>
+        <p:nvSpPr>
+          <p:cNvPr id="8" name="Text Placeholder 7">
+            <a:extLst>
+              <a:ext uri="{FF2B5EF4-FFF2-40B4-BE49-F238E27FC236}">
+                <a16:creationId xmlns:a16="http://schemas.microsoft.com/office/drawing/2014/main" id="{937AF956-2A90-4422-A3C2-A6109BD133BA}"/>
+              </a:ext>
+            </a:extLst>
+          </p:cNvPr>
+          <p:cNvSpPr>
+            <a:spLocks noGrp="1"/>
+          </p:cNvSpPr>
+          <p:nvPr>
+            <p:ph type="body" sz="quarter" idx="18"/>
+          </p:nvPr>
+        </p:nvSpPr>
+        <p:spPr>
+          <a:xfrm>
+            <a:off x="424800" y="3327399"/>
+            <a:ext cx="5468000" cy="2032001"/>
+          </a:xfrm>
+        </p:spPr>
+        <p:txBody>
+          <a:bodyPr/>
+          <a:lstStyle/>
+          <a:p>
+            <a:r>
+              <a:rPr lang="en-US" dirty="0"/>
+              <a:t>Lorem </a:t>
+            </a:r>
+            <a:r>
+              <a:rPr lang="en-US" noProof="1"/>
+              <a:t>ipsum dolor sit amet, consectetur adipiscing elit. Etiam aliquet eu mi quis lacinia. </a:t>
+            </a:r>
+          </a:p>
+          <a:p>
+            <a:r>
+              <a:rPr lang="en-US" noProof="1"/>
+              <a:t>Ut fermentum a magna ut eleifend. Integer convallis suscipit ante eu varius. </a:t>
+            </a:r>
+          </a:p>
+          <a:p>
+            <a:r>
+              <a:rPr lang="en-US" noProof="1"/>
+              <a:t>Morbi a purus dolor. Suspendisse sit amet ipsum finibus justo viverra blandit. Ut congue quis tortor eget sodales. </a:t>
+            </a:r>
+          </a:p>
+        </p:txBody>
+      </p:sp>
+      <p:sp>
+        <p:nvSpPr>
+          <p:cNvPr id="2" name="Title 1">
+            <a:extLst>
+              <a:ext uri="{FF2B5EF4-FFF2-40B4-BE49-F238E27FC236}">
+                <a16:creationId xmlns:a16="http://schemas.microsoft.com/office/drawing/2014/main" id="{63E41472-323F-47B9-8C9E-D3B43CA30C02}"/>
+              </a:ext>
+            </a:extLst>
+          </p:cNvPr>
+          <p:cNvSpPr>
+            <a:spLocks noGrp="1"/>
+          </p:cNvSpPr>
+          <p:nvPr>
+            <p:ph type="ctrTitle"/>
+          </p:nvPr>
+        </p:nvSpPr>
+        <p:spPr/>
+        <p:txBody>
+          <a:bodyPr/>
+          <a:lstStyle/>
+          <a:p>
+            <a:r>
+              <a:rPr lang="en-US" dirty="0"/>
+              <a:t>Summary</a:t>
+            </a:r>
+          </a:p>
+        </p:txBody>
+      </p:sp>
+      <p:pic>
+        <p:nvPicPr>
+          <p:cNvPr id="10" name="Picture Placeholder 9" descr="Image of office building windows">
+            <a:extLst>
+              <a:ext uri="{FF2B5EF4-FFF2-40B4-BE49-F238E27FC236}">
+                <a16:creationId xmlns:a16="http://schemas.microsoft.com/office/drawing/2014/main" id="{9663686B-44B2-425C-9F15-899A0641AA7D}"/>
+              </a:ext>
+            </a:extLst>
+          </p:cNvPr>
+          <p:cNvPicPr>
+            <a:picLocks noGrp="1" noChangeAspect="1"/>
+          </p:cNvPicPr>
+          <p:nvPr>
+            <p:ph type="pic" sz="quarter" idx="16"/>
+          </p:nvPr>
+        </p:nvPicPr>
+        <p:blipFill>
+          <a:blip r:embed="rId2">
+            <a:extLst>
+              <a:ext uri="{28A0092B-C50C-407E-A947-70E740481C1C}">
+                <a14:useLocalDpi xmlns:a14="http://schemas.microsoft.com/office/drawing/2010/main"/>
+              </a:ext>
+            </a:extLst>
+          </a:blip>
+          <a:stretch>
+            <a:fillRect/>
+          </a:stretch>
+        </p:blipFill>
+        <p:spPr>
+          <a:xfrm>
+            <a:off x="7652806" y="764519"/>
+            <a:ext cx="1872000" cy="1872000"/>
+          </a:xfrm>
+        </p:spPr>
+      </p:pic>
+      <p:pic>
+        <p:nvPicPr>
+          <p:cNvPr id="12" name="Picture Placeholder 11" descr="close up image of inside building material">
+            <a:extLst>
+              <a:ext uri="{FF2B5EF4-FFF2-40B4-BE49-F238E27FC236}">
+                <a16:creationId xmlns:a16="http://schemas.microsoft.com/office/drawing/2014/main" id="{C640A70E-BC90-4E9E-97DF-9D7362FEEC64}"/>
+              </a:ext>
+            </a:extLst>
+          </p:cNvPr>
+          <p:cNvPicPr>
+            <a:picLocks noGrp="1" noChangeAspect="1"/>
+          </p:cNvPicPr>
+          <p:nvPr>
+            <p:ph type="pic" sz="quarter" idx="17"/>
+          </p:nvPr>
+        </p:nvPicPr>
+        <p:blipFill>
+          <a:blip r:embed="rId3">
+            <a:extLst>
+              <a:ext uri="{28A0092B-C50C-407E-A947-70E740481C1C}">
+                <a14:useLocalDpi xmlns:a14="http://schemas.microsoft.com/office/drawing/2010/main"/>
+              </a:ext>
+            </a:extLst>
+          </a:blip>
+          <a:stretch>
+            <a:fillRect/>
+          </a:stretch>
+        </p:blipFill>
+        <p:spPr>
+          <a:xfrm>
+            <a:off x="9713594" y="767558"/>
+            <a:ext cx="1872000" cy="1865922"/>
+          </a:xfrm>
+        </p:spPr>
+      </p:pic>
+      <p:sp>
+        <p:nvSpPr>
           <p:cNvPr id="3" name="Subtitle 2">
             <a:extLst>
               <a:ext uri="{FF2B5EF4-FFF2-40B4-BE49-F238E27FC236}">
@@ -42612,7 +42183,7 @@
             <a:fld id="{19B51A1E-902D-48AF-9020-955120F399B6}" type="slidenum">
               <a:rPr lang="en-US" smtClean="0"/>
               <a:pPr/>
-              <a:t>21</a:t>
+              <a:t>20</a:t>
             </a:fld>
             <a:endParaRPr lang="en-US" dirty="0"/>
           </a:p>
@@ -42631,7 +42202,7 @@
 </p:sld>
 </file>
 
-<file path=ppt/slides/slide22.xml><?xml version="1.0" encoding="utf-8"?>
+<file path=ppt/slides/slide21.xml><?xml version="1.0" encoding="utf-8"?>
 <p:sld xmlns:a="http://schemas.openxmlformats.org/drawingml/2006/main" xmlns:r="http://schemas.openxmlformats.org/officeDocument/2006/relationships" xmlns:p="http://schemas.openxmlformats.org/presentationml/2006/main">
   <p:cSld>
     <p:spTree>
@@ -43323,7 +42894,7 @@
 </p:sld>
 </file>
 
-<file path=ppt/slides/slide23.xml><?xml version="1.0" encoding="utf-8"?>
+<file path=ppt/slides/slide22.xml><?xml version="1.0" encoding="utf-8"?>
 <p:sld xmlns:a="http://schemas.openxmlformats.org/drawingml/2006/main" xmlns:r="http://schemas.openxmlformats.org/officeDocument/2006/relationships" xmlns:p="http://schemas.openxmlformats.org/presentationml/2006/main">
   <p:cSld>
     <p:spTree>
@@ -43438,7 +43009,7 @@
             <a:fld id="{19B51A1E-902D-48AF-9020-955120F399B6}" type="slidenum">
               <a:rPr lang="en-US" smtClean="0"/>
               <a:pPr/>
-              <a:t>23</a:t>
+              <a:t>22</a:t>
             </a:fld>
             <a:endParaRPr lang="en-US" dirty="0"/>
           </a:p>
@@ -43476,542 +43047,6 @@
       </p:grpSpPr>
       <p:sp>
         <p:nvSpPr>
-          <p:cNvPr id="6" name="Content Placeholder 5">
-            <a:extLst>
-              <a:ext uri="{FF2B5EF4-FFF2-40B4-BE49-F238E27FC236}">
-                <a16:creationId xmlns:a16="http://schemas.microsoft.com/office/drawing/2014/main" id="{9365D194-85BA-4D50-B47D-062E79220FE0}"/>
-              </a:ext>
-            </a:extLst>
-          </p:cNvPr>
-          <p:cNvSpPr>
-            <a:spLocks noGrp="1"/>
-          </p:cNvSpPr>
-          <p:nvPr>
-            <p:ph idx="4294967295"/>
-          </p:nvPr>
-        </p:nvSpPr>
-        <p:spPr>
-          <a:xfrm>
-            <a:off x="424370" y="2905536"/>
-            <a:ext cx="5959013" cy="2954241"/>
-          </a:xfrm>
-        </p:spPr>
-        <p:txBody>
-          <a:bodyPr/>
-          <a:lstStyle/>
-          <a:p>
-            <a:pPr marL="0" indent="0">
-              <a:spcBef>
-                <a:spcPts val="0"/>
-              </a:spcBef>
-              <a:spcAft>
-                <a:spcPts val="1500"/>
-              </a:spcAft>
-              <a:buNone/>
-            </a:pPr>
-            <a:r>
-              <a:rPr lang="en-US" sz="3200" dirty="0"/>
-              <a:t>Lorem </a:t>
-            </a:r>
-            <a:r>
-              <a:rPr lang="en-US" sz="3200" noProof="1"/>
-              <a:t>ipsum dolor sit amet, consectetur adipiscing elit. </a:t>
-            </a:r>
-          </a:p>
-          <a:p>
-            <a:pPr>
-              <a:spcBef>
-                <a:spcPts val="0"/>
-              </a:spcBef>
-              <a:spcAft>
-                <a:spcPts val="1500"/>
-              </a:spcAft>
-            </a:pPr>
-            <a:r>
-              <a:rPr lang="en-US" noProof="1"/>
-              <a:t>Ut fermentum a magna ut eleifend. Integer convallis suscipit ante eu varius. </a:t>
-            </a:r>
-          </a:p>
-          <a:p>
-            <a:pPr>
-              <a:spcBef>
-                <a:spcPts val="0"/>
-              </a:spcBef>
-              <a:spcAft>
-                <a:spcPts val="1500"/>
-              </a:spcAft>
-            </a:pPr>
-            <a:r>
-              <a:rPr lang="en-US" noProof="1"/>
-              <a:t>Morbi a purus dolor. Suspendisse sit amet ipsum finibus justo viverra blandit. </a:t>
-            </a:r>
-          </a:p>
-          <a:p>
-            <a:pPr>
-              <a:spcBef>
-                <a:spcPts val="0"/>
-              </a:spcBef>
-              <a:spcAft>
-                <a:spcPts val="1500"/>
-              </a:spcAft>
-            </a:pPr>
-            <a:r>
-              <a:rPr lang="en-US" noProof="1"/>
-              <a:t>Ut congue quis tortor eget sodales. </a:t>
-            </a:r>
-          </a:p>
-        </p:txBody>
-      </p:sp>
-      <p:sp>
-        <p:nvSpPr>
-          <p:cNvPr id="2" name="Title 1">
-            <a:extLst>
-              <a:ext uri="{FF2B5EF4-FFF2-40B4-BE49-F238E27FC236}">
-                <a16:creationId xmlns:a16="http://schemas.microsoft.com/office/drawing/2014/main" id="{6719F29B-F233-48AF-8261-F33A4E079E3E}"/>
-              </a:ext>
-            </a:extLst>
-          </p:cNvPr>
-          <p:cNvSpPr>
-            <a:spLocks noGrp="1"/>
-          </p:cNvSpPr>
-          <p:nvPr>
-            <p:ph type="ctrTitle"/>
-          </p:nvPr>
-        </p:nvSpPr>
-        <p:spPr/>
-        <p:txBody>
-          <a:bodyPr/>
-          <a:lstStyle/>
-          <a:p>
-            <a:r>
-              <a:rPr lang="en-US" dirty="0"/>
-              <a:t>About Us</a:t>
-            </a:r>
-          </a:p>
-        </p:txBody>
-      </p:sp>
-      <p:sp>
-        <p:nvSpPr>
-          <p:cNvPr id="3" name="Subtitle 2">
-            <a:extLst>
-              <a:ext uri="{FF2B5EF4-FFF2-40B4-BE49-F238E27FC236}">
-                <a16:creationId xmlns:a16="http://schemas.microsoft.com/office/drawing/2014/main" id="{35E3EA69-4E0E-41BD-8095-A124225A2647}"/>
-              </a:ext>
-            </a:extLst>
-          </p:cNvPr>
-          <p:cNvSpPr>
-            <a:spLocks noGrp="1"/>
-          </p:cNvSpPr>
-          <p:nvPr>
-            <p:ph type="subTitle" idx="1"/>
-          </p:nvPr>
-        </p:nvSpPr>
-        <p:spPr/>
-        <p:txBody>
-          <a:bodyPr/>
-          <a:lstStyle/>
-          <a:p>
-            <a:r>
-              <a:rPr lang="en-US" dirty="0"/>
-              <a:t>Lorem ipsum dolor sit amet, consectetur adipiscing elit. Etiam aliquet eu mi quis lacinia. Ut fermentum a magna ut.</a:t>
-            </a:r>
-          </a:p>
-        </p:txBody>
-      </p:sp>
-      <p:pic>
-        <p:nvPicPr>
-          <p:cNvPr id="13" name="Picture Placeholder 12" descr="blueprtint drawing of a chair">
-            <a:extLst>
-              <a:ext uri="{FF2B5EF4-FFF2-40B4-BE49-F238E27FC236}">
-                <a16:creationId xmlns:a16="http://schemas.microsoft.com/office/drawing/2014/main" id="{6E643D59-F8F9-4C98-A5EE-B7CC655BB931}"/>
-              </a:ext>
-            </a:extLst>
-          </p:cNvPr>
-          <p:cNvPicPr>
-            <a:picLocks noGrp="1" noChangeAspect="1"/>
-          </p:cNvPicPr>
-          <p:nvPr>
-            <p:ph type="pic" sz="quarter" idx="16"/>
-          </p:nvPr>
-        </p:nvPicPr>
-        <p:blipFill>
-          <a:blip r:embed="rId2">
-            <a:extLst>
-              <a:ext uri="{28A0092B-C50C-407E-A947-70E740481C1C}">
-                <a14:useLocalDpi xmlns:a14="http://schemas.microsoft.com/office/drawing/2010/main"/>
-              </a:ext>
-            </a:extLst>
-          </a:blip>
-          <a:stretch>
-            <a:fillRect/>
-          </a:stretch>
-        </p:blipFill>
-        <p:spPr>
-          <a:xfrm>
-            <a:off x="7652806" y="764519"/>
-            <a:ext cx="1872000" cy="1872000"/>
-          </a:xfrm>
-        </p:spPr>
-      </p:pic>
-      <p:pic>
-        <p:nvPicPr>
-          <p:cNvPr id="12" name="Picture Placeholder 11" descr="close up image of inside building material">
-            <a:extLst>
-              <a:ext uri="{FF2B5EF4-FFF2-40B4-BE49-F238E27FC236}">
-                <a16:creationId xmlns:a16="http://schemas.microsoft.com/office/drawing/2014/main" id="{538221E8-A1FD-47AB-9710-BF80F25B9D30}"/>
-              </a:ext>
-            </a:extLst>
-          </p:cNvPr>
-          <p:cNvPicPr>
-            <a:picLocks noGrp="1" noChangeAspect="1"/>
-          </p:cNvPicPr>
-          <p:nvPr>
-            <p:ph type="pic" sz="quarter" idx="17"/>
-          </p:nvPr>
-        </p:nvPicPr>
-        <p:blipFill>
-          <a:blip r:embed="rId3">
-            <a:extLst>
-              <a:ext uri="{28A0092B-C50C-407E-A947-70E740481C1C}">
-                <a14:useLocalDpi xmlns:a14="http://schemas.microsoft.com/office/drawing/2010/main"/>
-              </a:ext>
-            </a:extLst>
-          </a:blip>
-          <a:stretch>
-            <a:fillRect/>
-          </a:stretch>
-        </p:blipFill>
-        <p:spPr>
-          <a:xfrm>
-            <a:off x="9713594" y="767558"/>
-            <a:ext cx="1872000" cy="1865922"/>
-          </a:xfrm>
-        </p:spPr>
-      </p:pic>
-      <p:sp>
-        <p:nvSpPr>
-          <p:cNvPr id="9" name="Rectangle 6">
-            <a:extLst>
-              <a:ext uri="{FF2B5EF4-FFF2-40B4-BE49-F238E27FC236}">
-                <a16:creationId xmlns:a16="http://schemas.microsoft.com/office/drawing/2014/main" id="{C9D745AD-2359-4511-AF2E-0CFC0783471A}"/>
-              </a:ext>
-              <a:ext uri="{C183D7F6-B498-43B3-948B-1728B52AA6E4}">
-                <adec:decorative xmlns:adec="http://schemas.microsoft.com/office/drawing/2017/decorative" val="1"/>
-              </a:ext>
-            </a:extLst>
-          </p:cNvPr>
-          <p:cNvSpPr/>
-          <p:nvPr/>
-        </p:nvSpPr>
-        <p:spPr>
-          <a:xfrm>
-            <a:off x="7453850" y="2814319"/>
-            <a:ext cx="4330700" cy="182434"/>
-          </a:xfrm>
-          <a:custGeom>
-            <a:avLst/>
-            <a:gdLst>
-              <a:gd name="connsiteX0" fmla="*/ 0 w 4330700"/>
-              <a:gd name="connsiteY0" fmla="*/ 0 h 588834"/>
-              <a:gd name="connsiteX1" fmla="*/ 4330700 w 4330700"/>
-              <a:gd name="connsiteY1" fmla="*/ 0 h 588834"/>
-              <a:gd name="connsiteX2" fmla="*/ 4330700 w 4330700"/>
-              <a:gd name="connsiteY2" fmla="*/ 588834 h 588834"/>
-              <a:gd name="connsiteX3" fmla="*/ 0 w 4330700"/>
-              <a:gd name="connsiteY3" fmla="*/ 588834 h 588834"/>
-              <a:gd name="connsiteX4" fmla="*/ 0 w 4330700"/>
-              <a:gd name="connsiteY4" fmla="*/ 0 h 588834"/>
-              <a:gd name="connsiteX0" fmla="*/ 4330700 w 4422140"/>
-              <a:gd name="connsiteY0" fmla="*/ 0 h 588834"/>
-              <a:gd name="connsiteX1" fmla="*/ 4330700 w 4422140"/>
-              <a:gd name="connsiteY1" fmla="*/ 588834 h 588834"/>
-              <a:gd name="connsiteX2" fmla="*/ 0 w 4422140"/>
-              <a:gd name="connsiteY2" fmla="*/ 588834 h 588834"/>
-              <a:gd name="connsiteX3" fmla="*/ 0 w 4422140"/>
-              <a:gd name="connsiteY3" fmla="*/ 0 h 588834"/>
-              <a:gd name="connsiteX4" fmla="*/ 4422140 w 4422140"/>
-              <a:gd name="connsiteY4" fmla="*/ 91440 h 588834"/>
-              <a:gd name="connsiteX0" fmla="*/ 4330700 w 4330700"/>
-              <a:gd name="connsiteY0" fmla="*/ 0 h 588834"/>
-              <a:gd name="connsiteX1" fmla="*/ 4330700 w 4330700"/>
-              <a:gd name="connsiteY1" fmla="*/ 588834 h 588834"/>
-              <a:gd name="connsiteX2" fmla="*/ 0 w 4330700"/>
-              <a:gd name="connsiteY2" fmla="*/ 588834 h 588834"/>
-              <a:gd name="connsiteX3" fmla="*/ 0 w 4330700"/>
-              <a:gd name="connsiteY3" fmla="*/ 0 h 588834"/>
-            </a:gdLst>
-            <a:ahLst/>
-            <a:cxnLst>
-              <a:cxn ang="0">
-                <a:pos x="connsiteX0" y="connsiteY0"/>
-              </a:cxn>
-              <a:cxn ang="0">
-                <a:pos x="connsiteX1" y="connsiteY1"/>
-              </a:cxn>
-              <a:cxn ang="0">
-                <a:pos x="connsiteX2" y="connsiteY2"/>
-              </a:cxn>
-              <a:cxn ang="0">
-                <a:pos x="connsiteX3" y="connsiteY3"/>
-              </a:cxn>
-            </a:cxnLst>
-            <a:rect l="l" t="t" r="r" b="b"/>
-            <a:pathLst>
-              <a:path w="4330700" h="588834">
-                <a:moveTo>
-                  <a:pt x="4330700" y="0"/>
-                </a:moveTo>
-                <a:lnTo>
-                  <a:pt x="4330700" y="588834"/>
-                </a:lnTo>
-                <a:lnTo>
-                  <a:pt x="0" y="588834"/>
-                </a:lnTo>
-                <a:lnTo>
-                  <a:pt x="0" y="0"/>
-                </a:lnTo>
-              </a:path>
-            </a:pathLst>
-          </a:custGeom>
-          <a:noFill/>
-          <a:ln>
-            <a:solidFill>
-              <a:schemeClr val="accent1"/>
-            </a:solidFill>
-          </a:ln>
-        </p:spPr>
-        <p:style>
-          <a:lnRef idx="2">
-            <a:schemeClr val="accent1">
-              <a:shade val="50000"/>
-            </a:schemeClr>
-          </a:lnRef>
-          <a:fillRef idx="1">
-            <a:schemeClr val="accent1"/>
-          </a:fillRef>
-          <a:effectRef idx="0">
-            <a:schemeClr val="accent1"/>
-          </a:effectRef>
-          <a:fontRef idx="minor">
-            <a:schemeClr val="lt1"/>
-          </a:fontRef>
-        </p:style>
-        <p:txBody>
-          <a:bodyPr rtlCol="0" anchor="ctr"/>
-          <a:lstStyle/>
-          <a:p>
-            <a:pPr algn="ctr"/>
-            <a:endParaRPr lang="en-US" dirty="0"/>
-          </a:p>
-        </p:txBody>
-      </p:sp>
-      <p:sp>
-        <p:nvSpPr>
-          <p:cNvPr id="10" name="Rectangle 6">
-            <a:extLst>
-              <a:ext uri="{FF2B5EF4-FFF2-40B4-BE49-F238E27FC236}">
-                <a16:creationId xmlns:a16="http://schemas.microsoft.com/office/drawing/2014/main" id="{A0F0B9BF-0637-4907-A537-C5F7C796FCA1}"/>
-              </a:ext>
-              <a:ext uri="{C183D7F6-B498-43B3-948B-1728B52AA6E4}">
-                <adec:decorative xmlns:adec="http://schemas.microsoft.com/office/drawing/2017/decorative" val="1"/>
-              </a:ext>
-            </a:extLst>
-          </p:cNvPr>
-          <p:cNvSpPr/>
-          <p:nvPr/>
-        </p:nvSpPr>
-        <p:spPr>
-          <a:xfrm flipV="1">
-            <a:off x="7453850" y="404285"/>
-            <a:ext cx="4330700" cy="182434"/>
-          </a:xfrm>
-          <a:custGeom>
-            <a:avLst/>
-            <a:gdLst>
-              <a:gd name="connsiteX0" fmla="*/ 0 w 4330700"/>
-              <a:gd name="connsiteY0" fmla="*/ 0 h 588834"/>
-              <a:gd name="connsiteX1" fmla="*/ 4330700 w 4330700"/>
-              <a:gd name="connsiteY1" fmla="*/ 0 h 588834"/>
-              <a:gd name="connsiteX2" fmla="*/ 4330700 w 4330700"/>
-              <a:gd name="connsiteY2" fmla="*/ 588834 h 588834"/>
-              <a:gd name="connsiteX3" fmla="*/ 0 w 4330700"/>
-              <a:gd name="connsiteY3" fmla="*/ 588834 h 588834"/>
-              <a:gd name="connsiteX4" fmla="*/ 0 w 4330700"/>
-              <a:gd name="connsiteY4" fmla="*/ 0 h 588834"/>
-              <a:gd name="connsiteX0" fmla="*/ 4330700 w 4422140"/>
-              <a:gd name="connsiteY0" fmla="*/ 0 h 588834"/>
-              <a:gd name="connsiteX1" fmla="*/ 4330700 w 4422140"/>
-              <a:gd name="connsiteY1" fmla="*/ 588834 h 588834"/>
-              <a:gd name="connsiteX2" fmla="*/ 0 w 4422140"/>
-              <a:gd name="connsiteY2" fmla="*/ 588834 h 588834"/>
-              <a:gd name="connsiteX3" fmla="*/ 0 w 4422140"/>
-              <a:gd name="connsiteY3" fmla="*/ 0 h 588834"/>
-              <a:gd name="connsiteX4" fmla="*/ 4422140 w 4422140"/>
-              <a:gd name="connsiteY4" fmla="*/ 91440 h 588834"/>
-              <a:gd name="connsiteX0" fmla="*/ 4330700 w 4330700"/>
-              <a:gd name="connsiteY0" fmla="*/ 0 h 588834"/>
-              <a:gd name="connsiteX1" fmla="*/ 4330700 w 4330700"/>
-              <a:gd name="connsiteY1" fmla="*/ 588834 h 588834"/>
-              <a:gd name="connsiteX2" fmla="*/ 0 w 4330700"/>
-              <a:gd name="connsiteY2" fmla="*/ 588834 h 588834"/>
-              <a:gd name="connsiteX3" fmla="*/ 0 w 4330700"/>
-              <a:gd name="connsiteY3" fmla="*/ 0 h 588834"/>
-            </a:gdLst>
-            <a:ahLst/>
-            <a:cxnLst>
-              <a:cxn ang="0">
-                <a:pos x="connsiteX0" y="connsiteY0"/>
-              </a:cxn>
-              <a:cxn ang="0">
-                <a:pos x="connsiteX1" y="connsiteY1"/>
-              </a:cxn>
-              <a:cxn ang="0">
-                <a:pos x="connsiteX2" y="connsiteY2"/>
-              </a:cxn>
-              <a:cxn ang="0">
-                <a:pos x="connsiteX3" y="connsiteY3"/>
-              </a:cxn>
-            </a:cxnLst>
-            <a:rect l="l" t="t" r="r" b="b"/>
-            <a:pathLst>
-              <a:path w="4330700" h="588834">
-                <a:moveTo>
-                  <a:pt x="4330700" y="0"/>
-                </a:moveTo>
-                <a:lnTo>
-                  <a:pt x="4330700" y="588834"/>
-                </a:lnTo>
-                <a:lnTo>
-                  <a:pt x="0" y="588834"/>
-                </a:lnTo>
-                <a:lnTo>
-                  <a:pt x="0" y="0"/>
-                </a:lnTo>
-              </a:path>
-            </a:pathLst>
-          </a:custGeom>
-          <a:noFill/>
-          <a:ln>
-            <a:solidFill>
-              <a:schemeClr val="accent1"/>
-            </a:solidFill>
-          </a:ln>
-        </p:spPr>
-        <p:style>
-          <a:lnRef idx="2">
-            <a:schemeClr val="accent1">
-              <a:shade val="50000"/>
-            </a:schemeClr>
-          </a:lnRef>
-          <a:fillRef idx="1">
-            <a:schemeClr val="accent1"/>
-          </a:fillRef>
-          <a:effectRef idx="0">
-            <a:schemeClr val="accent1"/>
-          </a:effectRef>
-          <a:fontRef idx="minor">
-            <a:schemeClr val="lt1"/>
-          </a:fontRef>
-        </p:style>
-        <p:txBody>
-          <a:bodyPr rtlCol="0" anchor="ctr"/>
-          <a:lstStyle/>
-          <a:p>
-            <a:pPr algn="ctr"/>
-            <a:endParaRPr lang="en-US" dirty="0"/>
-          </a:p>
-        </p:txBody>
-      </p:sp>
-      <p:sp>
-        <p:nvSpPr>
-          <p:cNvPr id="5" name="Footer Placeholder 4">
-            <a:extLst>
-              <a:ext uri="{FF2B5EF4-FFF2-40B4-BE49-F238E27FC236}">
-                <a16:creationId xmlns:a16="http://schemas.microsoft.com/office/drawing/2014/main" id="{AF29EA23-F34E-486A-B8B2-0C3019266975}"/>
-              </a:ext>
-            </a:extLst>
-          </p:cNvPr>
-          <p:cNvSpPr>
-            <a:spLocks noGrp="1"/>
-          </p:cNvSpPr>
-          <p:nvPr>
-            <p:ph type="ftr" sz="quarter" idx="12"/>
-          </p:nvPr>
-        </p:nvSpPr>
-        <p:spPr/>
-        <p:txBody>
-          <a:bodyPr/>
-          <a:lstStyle/>
-          <a:p>
-            <a:r>
-              <a:rPr lang="en-US" dirty="0"/>
-              <a:t>Add a footer</a:t>
-            </a:r>
-          </a:p>
-        </p:txBody>
-      </p:sp>
-      <p:sp>
-        <p:nvSpPr>
-          <p:cNvPr id="4" name="Slide Number Placeholder 3">
-            <a:extLst>
-              <a:ext uri="{FF2B5EF4-FFF2-40B4-BE49-F238E27FC236}">
-                <a16:creationId xmlns:a16="http://schemas.microsoft.com/office/drawing/2014/main" id="{328F602C-7F98-4C02-99D4-ED65E00D66A4}"/>
-              </a:ext>
-            </a:extLst>
-          </p:cNvPr>
-          <p:cNvSpPr>
-            <a:spLocks noGrp="1"/>
-          </p:cNvSpPr>
-          <p:nvPr>
-            <p:ph type="sldNum" sz="quarter" idx="11"/>
-          </p:nvPr>
-        </p:nvSpPr>
-        <p:spPr/>
-        <p:txBody>
-          <a:bodyPr/>
-          <a:lstStyle/>
-          <a:p>
-            <a:fld id="{19B51A1E-902D-48AF-9020-955120F399B6}" type="slidenum">
-              <a:rPr lang="en-US" smtClean="0"/>
-              <a:pPr/>
-              <a:t>3</a:t>
-            </a:fld>
-            <a:endParaRPr lang="en-US" dirty="0"/>
-          </a:p>
-        </p:txBody>
-      </p:sp>
-    </p:spTree>
-    <p:extLst>
-      <p:ext uri="{BB962C8B-B14F-4D97-AF65-F5344CB8AC3E}">
-        <p14:creationId xmlns:p14="http://schemas.microsoft.com/office/powerpoint/2010/main" val="2243494996"/>
-      </p:ext>
-    </p:extLst>
-  </p:cSld>
-  <p:clrMapOvr>
-    <a:masterClrMapping/>
-  </p:clrMapOvr>
-</p:sld>
-</file>
-
-<file path=ppt/slides/slide4.xml><?xml version="1.0" encoding="utf-8"?>
-<p:sld xmlns:a="http://schemas.openxmlformats.org/drawingml/2006/main" xmlns:r="http://schemas.openxmlformats.org/officeDocument/2006/relationships" xmlns:p="http://schemas.openxmlformats.org/presentationml/2006/main">
-  <p:cSld>
-    <p:spTree>
-      <p:nvGrpSpPr>
-        <p:cNvPr id="1" name=""/>
-        <p:cNvGrpSpPr/>
-        <p:nvPr/>
-      </p:nvGrpSpPr>
-      <p:grpSpPr>
-        <a:xfrm>
-          <a:off x="0" y="0"/>
-          <a:ext cx="0" cy="0"/>
-          <a:chOff x="0" y="0"/>
-          <a:chExt cx="0" cy="0"/>
-        </a:xfrm>
-      </p:grpSpPr>
-      <p:sp>
-        <p:nvSpPr>
           <p:cNvPr id="2" name="Title 1">
             <a:extLst>
               <a:ext uri="{FF2B5EF4-FFF2-40B4-BE49-F238E27FC236}">
@@ -44760,7 +43795,7 @@
             <a:fld id="{19B51A1E-902D-48AF-9020-955120F399B6}" type="slidenum">
               <a:rPr lang="en-US" smtClean="0"/>
               <a:pPr/>
-              <a:t>4</a:t>
+              <a:t>3</a:t>
             </a:fld>
             <a:endParaRPr lang="en-US" dirty="0"/>
           </a:p>
@@ -44779,7 +43814,7 @@
 </p:sld>
 </file>
 
-<file path=ppt/slides/slide5.xml><?xml version="1.0" encoding="utf-8"?>
+<file path=ppt/slides/slide4.xml><?xml version="1.0" encoding="utf-8"?>
 <p:sld xmlns:a="http://schemas.openxmlformats.org/drawingml/2006/main" xmlns:r="http://schemas.openxmlformats.org/officeDocument/2006/relationships" xmlns:p="http://schemas.openxmlformats.org/presentationml/2006/main">
   <p:cSld>
     <p:spTree>
@@ -45515,7 +44550,7 @@
             <a:fld id="{19B51A1E-902D-48AF-9020-955120F399B6}" type="slidenum">
               <a:rPr lang="en-US" smtClean="0"/>
               <a:pPr/>
-              <a:t>5</a:t>
+              <a:t>4</a:t>
             </a:fld>
             <a:endParaRPr lang="en-US" dirty="0"/>
           </a:p>
@@ -45534,7 +44569,7 @@
 </p:sld>
 </file>
 
-<file path=ppt/slides/slide6.xml><?xml version="1.0" encoding="utf-8"?>
+<file path=ppt/slides/slide5.xml><?xml version="1.0" encoding="utf-8"?>
 <p:sld xmlns:a="http://schemas.openxmlformats.org/drawingml/2006/main" xmlns:r="http://schemas.openxmlformats.org/officeDocument/2006/relationships" xmlns:p="http://schemas.openxmlformats.org/presentationml/2006/main">
   <p:cSld>
     <p:spTree>
@@ -46381,7 +45416,7 @@
             <a:fld id="{19B51A1E-902D-48AF-9020-955120F399B6}" type="slidenum">
               <a:rPr lang="en-US" smtClean="0"/>
               <a:pPr/>
-              <a:t>6</a:t>
+              <a:t>5</a:t>
             </a:fld>
             <a:endParaRPr lang="en-US" dirty="0"/>
           </a:p>
@@ -46400,7 +45435,7 @@
 </p:sld>
 </file>
 
-<file path=ppt/slides/slide7.xml><?xml version="1.0" encoding="utf-8"?>
+<file path=ppt/slides/slide6.xml><?xml version="1.0" encoding="utf-8"?>
 <p:sld xmlns:a="http://schemas.openxmlformats.org/drawingml/2006/main" xmlns:r="http://schemas.openxmlformats.org/officeDocument/2006/relationships" xmlns:p="http://schemas.openxmlformats.org/presentationml/2006/main">
   <p:cSld>
     <p:spTree>
@@ -46439,9 +45474,10 @@
           <a:lstStyle/>
           <a:p>
             <a:r>
-              <a:rPr lang="en-US" dirty="0"/>
-              <a:t>Digital Product</a:t>
-            </a:r>
+              <a:rPr lang="en-US"/>
+              <a:t>Overview of Topic</a:t>
+            </a:r>
+            <a:endParaRPr lang="en-US" dirty="0"/>
           </a:p>
         </p:txBody>
       </p:sp>
@@ -46610,7 +45646,7 @@
             <a:fld id="{19B51A1E-902D-48AF-9020-955120F399B6}" type="slidenum">
               <a:rPr lang="en-US" smtClean="0"/>
               <a:pPr/>
-              <a:t>7</a:t>
+              <a:t>6</a:t>
             </a:fld>
             <a:endParaRPr lang="en-US" dirty="0"/>
           </a:p>
@@ -46629,7 +45665,7 @@
 </p:sld>
 </file>
 
-<file path=ppt/slides/slide8.xml><?xml version="1.0" encoding="utf-8"?>
+<file path=ppt/slides/slide7.xml><?xml version="1.0" encoding="utf-8"?>
 <p:sld xmlns:a="http://schemas.openxmlformats.org/drawingml/2006/main" xmlns:r="http://schemas.openxmlformats.org/officeDocument/2006/relationships" xmlns:p="http://schemas.openxmlformats.org/presentationml/2006/main">
   <p:cSld>
     <p:spTree>
@@ -47067,7 +46103,7 @@
             <a:fld id="{19B51A1E-902D-48AF-9020-955120F399B6}" type="slidenum">
               <a:rPr lang="en-US" smtClean="0"/>
               <a:pPr/>
-              <a:t>8</a:t>
+              <a:t>7</a:t>
             </a:fld>
             <a:endParaRPr lang="en-US" dirty="0"/>
           </a:p>
@@ -47077,6 +46113,471 @@
     <p:extLst>
       <p:ext uri="{BB962C8B-B14F-4D97-AF65-F5344CB8AC3E}">
         <p14:creationId xmlns:p14="http://schemas.microsoft.com/office/powerpoint/2010/main" val="1931436569"/>
+      </p:ext>
+    </p:extLst>
+  </p:cSld>
+  <p:clrMapOvr>
+    <a:masterClrMapping/>
+  </p:clrMapOvr>
+</p:sld>
+</file>
+
+<file path=ppt/slides/slide8.xml><?xml version="1.0" encoding="utf-8"?>
+<p:sld xmlns:a="http://schemas.openxmlformats.org/drawingml/2006/main" xmlns:r="http://schemas.openxmlformats.org/officeDocument/2006/relationships" xmlns:p="http://schemas.openxmlformats.org/presentationml/2006/main">
+  <p:cSld>
+    <p:spTree>
+      <p:nvGrpSpPr>
+        <p:cNvPr id="1" name=""/>
+        <p:cNvGrpSpPr/>
+        <p:nvPr/>
+      </p:nvGrpSpPr>
+      <p:grpSpPr>
+        <a:xfrm>
+          <a:off x="0" y="0"/>
+          <a:ext cx="0" cy="0"/>
+          <a:chOff x="0" y="0"/>
+          <a:chExt cx="0" cy="0"/>
+        </a:xfrm>
+      </p:grpSpPr>
+      <p:sp>
+        <p:nvSpPr>
+          <p:cNvPr id="2" name="Title 1">
+            <a:extLst>
+              <a:ext uri="{FF2B5EF4-FFF2-40B4-BE49-F238E27FC236}">
+                <a16:creationId xmlns:a16="http://schemas.microsoft.com/office/drawing/2014/main" id="{8A4E0A63-A388-49B1-A04E-27CE9BD622EF}"/>
+              </a:ext>
+            </a:extLst>
+          </p:cNvPr>
+          <p:cNvSpPr>
+            <a:spLocks noGrp="1"/>
+          </p:cNvSpPr>
+          <p:nvPr>
+            <p:ph type="title"/>
+          </p:nvPr>
+        </p:nvSpPr>
+        <p:spPr/>
+        <p:txBody>
+          <a:bodyPr/>
+          <a:lstStyle/>
+          <a:p>
+            <a:r>
+              <a:rPr lang="en-US" dirty="0"/>
+              <a:t>Business Model</a:t>
+            </a:r>
+          </a:p>
+        </p:txBody>
+      </p:sp>
+      <p:sp>
+        <p:nvSpPr>
+          <p:cNvPr id="14" name="Text Placeholder 13">
+            <a:extLst>
+              <a:ext uri="{FF2B5EF4-FFF2-40B4-BE49-F238E27FC236}">
+                <a16:creationId xmlns:a16="http://schemas.microsoft.com/office/drawing/2014/main" id="{4EA1AB58-0440-4072-A743-8B87B5BDF367}"/>
+              </a:ext>
+            </a:extLst>
+          </p:cNvPr>
+          <p:cNvSpPr>
+            <a:spLocks noGrp="1"/>
+          </p:cNvSpPr>
+          <p:nvPr>
+            <p:ph type="body" sz="quarter" idx="32"/>
+          </p:nvPr>
+        </p:nvSpPr>
+        <p:spPr/>
+        <p:txBody>
+          <a:bodyPr/>
+          <a:lstStyle/>
+          <a:p>
+            <a:r>
+              <a:rPr lang="en-US" dirty="0"/>
+              <a:t>There is an opportunity for success</a:t>
+            </a:r>
+          </a:p>
+        </p:txBody>
+      </p:sp>
+      <p:pic>
+        <p:nvPicPr>
+          <p:cNvPr id="34" name="Picture Placeholder 11" descr="Teacher">
+            <a:extLst>
+              <a:ext uri="{FF2B5EF4-FFF2-40B4-BE49-F238E27FC236}">
+                <a16:creationId xmlns:a16="http://schemas.microsoft.com/office/drawing/2014/main" id="{BCF515DC-353A-4948-84E1-001D6B6C7090}"/>
+              </a:ext>
+            </a:extLst>
+          </p:cNvPr>
+          <p:cNvPicPr>
+            <a:picLocks noChangeAspect="1"/>
+          </p:cNvPicPr>
+          <p:nvPr/>
+        </p:nvPicPr>
+        <p:blipFill>
+          <a:blip r:embed="rId2">
+            <a:extLst>
+              <a:ext uri="{28A0092B-C50C-407E-A947-70E740481C1C}">
+                <a14:useLocalDpi xmlns:a14="http://schemas.microsoft.com/office/drawing/2010/main"/>
+              </a:ext>
+              <a:ext uri="{96DAC541-7B7A-43D3-8B79-37D633B846F1}">
+                <asvg:svgBlip xmlns:asvg="http://schemas.microsoft.com/office/drawing/2016/SVG/main" r:embed="rId3"/>
+              </a:ext>
+            </a:extLst>
+          </a:blip>
+          <a:srcRect/>
+          <a:stretch>
+            <a:fillRect/>
+          </a:stretch>
+        </p:blipFill>
+        <p:spPr>
+          <a:xfrm>
+            <a:off x="3448866" y="2406502"/>
+            <a:ext cx="625968" cy="625968"/>
+          </a:xfrm>
+          <a:prstGeom prst="rect">
+            <a:avLst/>
+          </a:prstGeom>
+          <a:noFill/>
+          <a:ln w="95250" cap="sq" cmpd="sng" algn="ctr">
+            <a:noFill/>
+            <a:prstDash val="solid"/>
+            <a:miter lim="800000"/>
+          </a:ln>
+          <a:effectLst/>
+        </p:spPr>
+      </p:pic>
+      <p:sp>
+        <p:nvSpPr>
+          <p:cNvPr id="5" name="Text Placeholder 4">
+            <a:extLst>
+              <a:ext uri="{FF2B5EF4-FFF2-40B4-BE49-F238E27FC236}">
+                <a16:creationId xmlns:a16="http://schemas.microsoft.com/office/drawing/2014/main" id="{06E82690-B145-4D4F-B2D1-0B2A8C50FD71}"/>
+              </a:ext>
+            </a:extLst>
+          </p:cNvPr>
+          <p:cNvSpPr>
+            <a:spLocks noGrp="1"/>
+          </p:cNvSpPr>
+          <p:nvPr>
+            <p:ph type="body" sz="quarter" idx="33"/>
+          </p:nvPr>
+        </p:nvSpPr>
+        <p:spPr/>
+        <p:txBody>
+          <a:bodyPr/>
+          <a:lstStyle/>
+          <a:p>
+            <a:r>
+              <a:rPr lang="en-US" dirty="0"/>
+              <a:t>Research</a:t>
+            </a:r>
+          </a:p>
+        </p:txBody>
+      </p:sp>
+      <p:sp>
+        <p:nvSpPr>
+          <p:cNvPr id="6" name="Text Placeholder 5">
+            <a:extLst>
+              <a:ext uri="{FF2B5EF4-FFF2-40B4-BE49-F238E27FC236}">
+                <a16:creationId xmlns:a16="http://schemas.microsoft.com/office/drawing/2014/main" id="{7640DF9D-0C9E-4C5D-9635-6B4DE10CCEE5}"/>
+              </a:ext>
+            </a:extLst>
+          </p:cNvPr>
+          <p:cNvSpPr>
+            <a:spLocks noGrp="1"/>
+          </p:cNvSpPr>
+          <p:nvPr>
+            <p:ph type="body" sz="quarter" idx="34"/>
+          </p:nvPr>
+        </p:nvSpPr>
+        <p:spPr/>
+        <p:txBody>
+          <a:bodyPr/>
+          <a:lstStyle/>
+          <a:p>
+            <a:r>
+              <a:rPr lang="en-US" dirty="0"/>
+              <a:t>Lorem </a:t>
+            </a:r>
+            <a:r>
+              <a:rPr lang="en-US" noProof="1"/>
+              <a:t>ipsum dolor sit amet, consectetur adipiscing elit. </a:t>
+            </a:r>
+          </a:p>
+        </p:txBody>
+      </p:sp>
+      <p:pic>
+        <p:nvPicPr>
+          <p:cNvPr id="35" name="Picture Placeholder 15" descr="Group">
+            <a:extLst>
+              <a:ext uri="{FF2B5EF4-FFF2-40B4-BE49-F238E27FC236}">
+                <a16:creationId xmlns:a16="http://schemas.microsoft.com/office/drawing/2014/main" id="{FD22C7BB-0313-DD45-87C7-17AC5A8AEB51}"/>
+              </a:ext>
+            </a:extLst>
+          </p:cNvPr>
+          <p:cNvPicPr>
+            <a:picLocks noChangeAspect="1"/>
+          </p:cNvPicPr>
+          <p:nvPr/>
+        </p:nvPicPr>
+        <p:blipFill>
+          <a:blip r:embed="rId4">
+            <a:extLst>
+              <a:ext uri="{28A0092B-C50C-407E-A947-70E740481C1C}">
+                <a14:useLocalDpi xmlns:a14="http://schemas.microsoft.com/office/drawing/2010/main"/>
+              </a:ext>
+              <a:ext uri="{96DAC541-7B7A-43D3-8B79-37D633B846F1}">
+                <asvg:svgBlip xmlns:asvg="http://schemas.microsoft.com/office/drawing/2016/SVG/main" r:embed="rId5"/>
+              </a:ext>
+            </a:extLst>
+          </a:blip>
+          <a:srcRect/>
+          <a:stretch>
+            <a:fillRect/>
+          </a:stretch>
+        </p:blipFill>
+        <p:spPr>
+          <a:xfrm>
+            <a:off x="5788916" y="2419202"/>
+            <a:ext cx="625968" cy="625968"/>
+          </a:xfrm>
+          <a:prstGeom prst="rect">
+            <a:avLst/>
+          </a:prstGeom>
+          <a:noFill/>
+          <a:ln w="95250" cap="sq" cmpd="sng" algn="ctr">
+            <a:noFill/>
+            <a:prstDash val="solid"/>
+            <a:miter lim="800000"/>
+          </a:ln>
+          <a:effectLst/>
+        </p:spPr>
+      </p:pic>
+      <p:sp>
+        <p:nvSpPr>
+          <p:cNvPr id="7" name="Text Placeholder 6">
+            <a:extLst>
+              <a:ext uri="{FF2B5EF4-FFF2-40B4-BE49-F238E27FC236}">
+                <a16:creationId xmlns:a16="http://schemas.microsoft.com/office/drawing/2014/main" id="{40297407-CE4E-4284-879D-AEC395713625}"/>
+              </a:ext>
+            </a:extLst>
+          </p:cNvPr>
+          <p:cNvSpPr>
+            <a:spLocks noGrp="1"/>
+          </p:cNvSpPr>
+          <p:nvPr>
+            <p:ph type="body" sz="quarter" idx="35"/>
+          </p:nvPr>
+        </p:nvSpPr>
+        <p:spPr/>
+        <p:txBody>
+          <a:bodyPr/>
+          <a:lstStyle/>
+          <a:p>
+            <a:r>
+              <a:rPr lang="en-US" dirty="0"/>
+              <a:t>Abstract</a:t>
+            </a:r>
+          </a:p>
+        </p:txBody>
+      </p:sp>
+      <p:sp>
+        <p:nvSpPr>
+          <p:cNvPr id="8" name="Text Placeholder 7">
+            <a:extLst>
+              <a:ext uri="{FF2B5EF4-FFF2-40B4-BE49-F238E27FC236}">
+                <a16:creationId xmlns:a16="http://schemas.microsoft.com/office/drawing/2014/main" id="{F5C3A7BE-F7FC-4942-A31A-491A8A806103}"/>
+              </a:ext>
+            </a:extLst>
+          </p:cNvPr>
+          <p:cNvSpPr>
+            <a:spLocks noGrp="1"/>
+          </p:cNvSpPr>
+          <p:nvPr>
+            <p:ph type="body" sz="quarter" idx="36"/>
+          </p:nvPr>
+        </p:nvSpPr>
+        <p:spPr/>
+        <p:txBody>
+          <a:bodyPr/>
+          <a:lstStyle/>
+          <a:p>
+            <a:r>
+              <a:rPr lang="en-US" dirty="0"/>
+              <a:t>Lorem </a:t>
+            </a:r>
+            <a:r>
+              <a:rPr lang="en-US" noProof="1"/>
+              <a:t>ipsum dolor sit amet, consectetur adipiscing elit. </a:t>
+            </a:r>
+          </a:p>
+        </p:txBody>
+      </p:sp>
+      <p:pic>
+        <p:nvPicPr>
+          <p:cNvPr id="36" name="Picture Placeholder 17" descr="Repeat">
+            <a:extLst>
+              <a:ext uri="{FF2B5EF4-FFF2-40B4-BE49-F238E27FC236}">
+                <a16:creationId xmlns:a16="http://schemas.microsoft.com/office/drawing/2014/main" id="{BE1AEB62-723B-1141-822C-73271BB1CDB3}"/>
+              </a:ext>
+            </a:extLst>
+          </p:cNvPr>
+          <p:cNvPicPr>
+            <a:picLocks noChangeAspect="1"/>
+          </p:cNvPicPr>
+          <p:nvPr/>
+        </p:nvPicPr>
+        <p:blipFill>
+          <a:blip r:embed="rId6">
+            <a:extLst>
+              <a:ext uri="{28A0092B-C50C-407E-A947-70E740481C1C}">
+                <a14:useLocalDpi xmlns:a14="http://schemas.microsoft.com/office/drawing/2010/main"/>
+              </a:ext>
+              <a:ext uri="{96DAC541-7B7A-43D3-8B79-37D633B846F1}">
+                <asvg:svgBlip xmlns:asvg="http://schemas.microsoft.com/office/drawing/2016/SVG/main" r:embed="rId7"/>
+              </a:ext>
+            </a:extLst>
+          </a:blip>
+          <a:srcRect/>
+          <a:stretch>
+            <a:fillRect/>
+          </a:stretch>
+        </p:blipFill>
+        <p:spPr>
+          <a:xfrm>
+            <a:off x="8128966" y="2406502"/>
+            <a:ext cx="625968" cy="625968"/>
+          </a:xfrm>
+          <a:prstGeom prst="rect">
+            <a:avLst/>
+          </a:prstGeom>
+          <a:noFill/>
+          <a:ln w="95250" cap="sq" cmpd="sng" algn="ctr">
+            <a:noFill/>
+            <a:prstDash val="solid"/>
+            <a:miter lim="800000"/>
+          </a:ln>
+          <a:effectLst/>
+        </p:spPr>
+      </p:pic>
+      <p:sp>
+        <p:nvSpPr>
+          <p:cNvPr id="9" name="Text Placeholder 8">
+            <a:extLst>
+              <a:ext uri="{FF2B5EF4-FFF2-40B4-BE49-F238E27FC236}">
+                <a16:creationId xmlns:a16="http://schemas.microsoft.com/office/drawing/2014/main" id="{95CCE699-03D1-4642-B46A-B14EF17DA183}"/>
+              </a:ext>
+            </a:extLst>
+          </p:cNvPr>
+          <p:cNvSpPr>
+            <a:spLocks noGrp="1"/>
+          </p:cNvSpPr>
+          <p:nvPr>
+            <p:ph type="body" sz="quarter" idx="37"/>
+          </p:nvPr>
+        </p:nvSpPr>
+        <p:spPr/>
+        <p:txBody>
+          <a:bodyPr/>
+          <a:lstStyle/>
+          <a:p>
+            <a:r>
+              <a:rPr lang="en-US" dirty="0"/>
+              <a:t>Design</a:t>
+            </a:r>
+          </a:p>
+        </p:txBody>
+      </p:sp>
+      <p:sp>
+        <p:nvSpPr>
+          <p:cNvPr id="10" name="Text Placeholder 9">
+            <a:extLst>
+              <a:ext uri="{FF2B5EF4-FFF2-40B4-BE49-F238E27FC236}">
+                <a16:creationId xmlns:a16="http://schemas.microsoft.com/office/drawing/2014/main" id="{BC1DF189-6F2F-4C21-88CC-C82D3D0D147B}"/>
+              </a:ext>
+            </a:extLst>
+          </p:cNvPr>
+          <p:cNvSpPr>
+            <a:spLocks noGrp="1"/>
+          </p:cNvSpPr>
+          <p:nvPr>
+            <p:ph type="body" sz="quarter" idx="38"/>
+          </p:nvPr>
+        </p:nvSpPr>
+        <p:spPr/>
+        <p:txBody>
+          <a:bodyPr/>
+          <a:lstStyle/>
+          <a:p>
+            <a:r>
+              <a:rPr lang="en-US" dirty="0"/>
+              <a:t>Lorem </a:t>
+            </a:r>
+            <a:r>
+              <a:rPr lang="en-US" noProof="1"/>
+              <a:t>ipsum dolor sit amet, consectetur adipiscing elit. </a:t>
+            </a:r>
+          </a:p>
+        </p:txBody>
+      </p:sp>
+      <p:sp>
+        <p:nvSpPr>
+          <p:cNvPr id="3" name="Footer Placeholder 2">
+            <a:extLst>
+              <a:ext uri="{FF2B5EF4-FFF2-40B4-BE49-F238E27FC236}">
+                <a16:creationId xmlns:a16="http://schemas.microsoft.com/office/drawing/2014/main" id="{005C44B1-BA82-483C-BD91-F89067442F9E}"/>
+              </a:ext>
+            </a:extLst>
+          </p:cNvPr>
+          <p:cNvSpPr>
+            <a:spLocks noGrp="1"/>
+          </p:cNvSpPr>
+          <p:nvPr>
+            <p:ph type="ftr" sz="quarter" idx="10"/>
+          </p:nvPr>
+        </p:nvSpPr>
+        <p:spPr/>
+        <p:txBody>
+          <a:bodyPr/>
+          <a:lstStyle/>
+          <a:p>
+            <a:r>
+              <a:rPr lang="en-US" dirty="0"/>
+              <a:t>Add a footer</a:t>
+            </a:r>
+          </a:p>
+        </p:txBody>
+      </p:sp>
+      <p:sp>
+        <p:nvSpPr>
+          <p:cNvPr id="4" name="Slide Number Placeholder 3">
+            <a:extLst>
+              <a:ext uri="{FF2B5EF4-FFF2-40B4-BE49-F238E27FC236}">
+                <a16:creationId xmlns:a16="http://schemas.microsoft.com/office/drawing/2014/main" id="{79ED4A67-3A46-4F54-A12A-EAE1B53E6457}"/>
+              </a:ext>
+            </a:extLst>
+          </p:cNvPr>
+          <p:cNvSpPr>
+            <a:spLocks noGrp="1"/>
+          </p:cNvSpPr>
+          <p:nvPr>
+            <p:ph type="sldNum" sz="quarter" idx="11"/>
+          </p:nvPr>
+        </p:nvSpPr>
+        <p:spPr/>
+        <p:txBody>
+          <a:bodyPr/>
+          <a:lstStyle/>
+          <a:p>
+            <a:fld id="{19B51A1E-902D-48AF-9020-955120F399B6}" type="slidenum">
+              <a:rPr lang="en-US" smtClean="0"/>
+              <a:pPr/>
+              <a:t>8</a:t>
+            </a:fld>
+            <a:endParaRPr lang="en-US" dirty="0"/>
+          </a:p>
+        </p:txBody>
+      </p:sp>
+    </p:spTree>
+    <p:extLst>
+      <p:ext uri="{BB962C8B-B14F-4D97-AF65-F5344CB8AC3E}">
+        <p14:creationId xmlns:p14="http://schemas.microsoft.com/office/powerpoint/2010/main" val="2069393026"/>
       </p:ext>
     </p:extLst>
   </p:cSld>
@@ -47105,10 +46606,10 @@
       </p:grpSpPr>
       <p:sp>
         <p:nvSpPr>
-          <p:cNvPr id="2" name="Title 1">
-            <a:extLst>
-              <a:ext uri="{FF2B5EF4-FFF2-40B4-BE49-F238E27FC236}">
-                <a16:creationId xmlns:a16="http://schemas.microsoft.com/office/drawing/2014/main" id="{8A4E0A63-A388-49B1-A04E-27CE9BD622EF}"/>
+          <p:cNvPr id="12" name="Title 11">
+            <a:extLst>
+              <a:ext uri="{FF2B5EF4-FFF2-40B4-BE49-F238E27FC236}">
+                <a16:creationId xmlns:a16="http://schemas.microsoft.com/office/drawing/2014/main" id="{6840293F-4671-41F0-81A3-F8908F7DBA05}"/>
               </a:ext>
             </a:extLst>
           </p:cNvPr>
@@ -47126,17 +46627,17 @@
           <a:p>
             <a:r>
               <a:rPr lang="en-US" dirty="0"/>
-              <a:t>Business Model</a:t>
-            </a:r>
-          </a:p>
-        </p:txBody>
-      </p:sp>
-      <p:sp>
-        <p:nvSpPr>
-          <p:cNvPr id="14" name="Text Placeholder 13">
-            <a:extLst>
-              <a:ext uri="{FF2B5EF4-FFF2-40B4-BE49-F238E27FC236}">
-                <a16:creationId xmlns:a16="http://schemas.microsoft.com/office/drawing/2014/main" id="{4EA1AB58-0440-4072-A743-8B87B5BDF367}"/>
+              <a:t>Market Opportunity Option 1</a:t>
+            </a:r>
+          </a:p>
+        </p:txBody>
+      </p:sp>
+      <p:sp>
+        <p:nvSpPr>
+          <p:cNvPr id="17" name="Text Placeholder 16">
+            <a:extLst>
+              <a:ext uri="{FF2B5EF4-FFF2-40B4-BE49-F238E27FC236}">
+                <a16:creationId xmlns:a16="http://schemas.microsoft.com/office/drawing/2014/main" id="{6A68A20E-73E6-4BDD-826F-851FE419CF78}"/>
               </a:ext>
             </a:extLst>
           </p:cNvPr>
@@ -47154,27 +46655,29 @@
           <a:p>
             <a:r>
               <a:rPr lang="en-US" dirty="0"/>
-              <a:t>There is an opportunity for success</a:t>
+              <a:t>Lorem ipsum dolor sit amet, consectetur adipiscing elit. </a:t>
             </a:r>
           </a:p>
         </p:txBody>
       </p:sp>
       <p:pic>
         <p:nvPicPr>
-          <p:cNvPr id="34" name="Picture Placeholder 11" descr="Teacher">
-            <a:extLst>
-              <a:ext uri="{FF2B5EF4-FFF2-40B4-BE49-F238E27FC236}">
-                <a16:creationId xmlns:a16="http://schemas.microsoft.com/office/drawing/2014/main" id="{BCF515DC-353A-4948-84E1-001D6B6C7090}"/>
+          <p:cNvPr id="5" name="Picture Placeholder 4" descr="Bullseye">
+            <a:extLst>
+              <a:ext uri="{FF2B5EF4-FFF2-40B4-BE49-F238E27FC236}">
+                <a16:creationId xmlns:a16="http://schemas.microsoft.com/office/drawing/2014/main" id="{54A3BFA2-FCD4-4F41-AAAD-8DAF2B85DA36}"/>
               </a:ext>
             </a:extLst>
           </p:cNvPr>
           <p:cNvPicPr>
-            <a:picLocks noChangeAspect="1"/>
+            <a:picLocks noGrp="1" noChangeAspect="1"/>
           </p:cNvPicPr>
-          <p:nvPr/>
+          <p:nvPr>
+            <p:ph type="pic" sz="quarter" idx="33"/>
+          </p:nvPr>
         </p:nvPicPr>
         <p:blipFill>
-          <a:blip r:embed="rId2">
+          <a:blip r:embed="rId2" cstate="screen">
             <a:extLst>
               <a:ext uri="{28A0092B-C50C-407E-A947-70E740481C1C}">
                 <a14:useLocalDpi xmlns:a14="http://schemas.microsoft.com/office/drawing/2010/main"/>
@@ -47189,29 +46692,14 @@
             <a:fillRect/>
           </a:stretch>
         </p:blipFill>
-        <p:spPr>
-          <a:xfrm>
-            <a:off x="3448866" y="2406502"/>
-            <a:ext cx="625968" cy="625968"/>
-          </a:xfrm>
-          <a:prstGeom prst="rect">
-            <a:avLst/>
-          </a:prstGeom>
-          <a:noFill/>
-          <a:ln w="95250" cap="sq" cmpd="sng" algn="ctr">
-            <a:noFill/>
-            <a:prstDash val="solid"/>
-            <a:miter lim="800000"/>
-          </a:ln>
-          <a:effectLst/>
-        </p:spPr>
+        <p:spPr/>
       </p:pic>
       <p:sp>
         <p:nvSpPr>
-          <p:cNvPr id="5" name="Text Placeholder 4">
-            <a:extLst>
-              <a:ext uri="{FF2B5EF4-FFF2-40B4-BE49-F238E27FC236}">
-                <a16:creationId xmlns:a16="http://schemas.microsoft.com/office/drawing/2014/main" id="{06E82690-B145-4D4F-B2D1-0B2A8C50FD71}"/>
+          <p:cNvPr id="14" name="Text Placeholder 13">
+            <a:extLst>
+              <a:ext uri="{FF2B5EF4-FFF2-40B4-BE49-F238E27FC236}">
+                <a16:creationId xmlns:a16="http://schemas.microsoft.com/office/drawing/2014/main" id="{7E56E477-6E54-4833-B1E4-56C1AC66C582}"/>
               </a:ext>
             </a:extLst>
           </p:cNvPr>
@@ -47219,7 +46707,7 @@
             <a:spLocks noGrp="1"/>
           </p:cNvSpPr>
           <p:nvPr>
-            <p:ph type="body" sz="quarter" idx="33"/>
+            <p:ph type="body" sz="quarter" idx="27"/>
           </p:nvPr>
         </p:nvSpPr>
         <p:spPr/>
@@ -47229,17 +46717,17 @@
           <a:p>
             <a:r>
               <a:rPr lang="en-US" dirty="0"/>
-              <a:t>Research</a:t>
-            </a:r>
-          </a:p>
-        </p:txBody>
-      </p:sp>
-      <p:sp>
-        <p:nvSpPr>
-          <p:cNvPr id="6" name="Text Placeholder 5">
-            <a:extLst>
-              <a:ext uri="{FF2B5EF4-FFF2-40B4-BE49-F238E27FC236}">
-                <a16:creationId xmlns:a16="http://schemas.microsoft.com/office/drawing/2014/main" id="{7640DF9D-0C9E-4C5D-9635-6B4DE10CCEE5}"/>
+              <a:t>$1B</a:t>
+            </a:r>
+          </a:p>
+        </p:txBody>
+      </p:sp>
+      <p:sp>
+        <p:nvSpPr>
+          <p:cNvPr id="15" name="Content Placeholder 14">
+            <a:extLst>
+              <a:ext uri="{FF2B5EF4-FFF2-40B4-BE49-F238E27FC236}">
+                <a16:creationId xmlns:a16="http://schemas.microsoft.com/office/drawing/2014/main" id="{7F07C326-ECF8-41DF-9B2E-D430DEFF9A67}"/>
               </a:ext>
             </a:extLst>
           </p:cNvPr>
@@ -47247,7 +46735,7 @@
             <a:spLocks noGrp="1"/>
           </p:cNvSpPr>
           <p:nvPr>
-            <p:ph type="body" sz="quarter" idx="34"/>
+            <p:ph sz="half" idx="29"/>
           </p:nvPr>
         </p:nvSpPr>
         <p:spPr/>
@@ -47257,31 +46745,45 @@
           <a:p>
             <a:r>
               <a:rPr lang="en-US" dirty="0"/>
-              <a:t>Lorem </a:t>
+              <a:t>Lorem ipsum </a:t>
             </a:r>
             <a:r>
               <a:rPr lang="en-US" noProof="1"/>
-              <a:t>ipsum dolor sit amet, consectetur adipiscing elit. </a:t>
+              <a:t>dolor sit amet, consectetur adipiscing elit. </a:t>
+            </a:r>
+          </a:p>
+          <a:p>
+            <a:r>
+              <a:rPr lang="en-US" noProof="1"/>
+              <a:t>Etiam aliquet eu mi quis lacinia. Ut fermentum a magna ut eleifend. Integer convallis suscipit ante eu varius. </a:t>
+            </a:r>
+          </a:p>
+          <a:p>
+            <a:r>
+              <a:rPr lang="en-US" noProof="1"/>
+              <a:t>Morbi a purus dolor. Suspendisse sit amet ipsum finibus justo viverra blandit.</a:t>
             </a:r>
           </a:p>
         </p:txBody>
       </p:sp>
       <p:pic>
         <p:nvPicPr>
-          <p:cNvPr id="35" name="Picture Placeholder 15" descr="Group">
-            <a:extLst>
-              <a:ext uri="{FF2B5EF4-FFF2-40B4-BE49-F238E27FC236}">
-                <a16:creationId xmlns:a16="http://schemas.microsoft.com/office/drawing/2014/main" id="{FD22C7BB-0313-DD45-87C7-17AC5A8AEB51}"/>
+          <p:cNvPr id="7" name="Picture Placeholder 6" descr="Lecturer">
+            <a:extLst>
+              <a:ext uri="{FF2B5EF4-FFF2-40B4-BE49-F238E27FC236}">
+                <a16:creationId xmlns:a16="http://schemas.microsoft.com/office/drawing/2014/main" id="{46483697-076C-45F1-BEB8-4E596D745014}"/>
               </a:ext>
             </a:extLst>
           </p:cNvPr>
           <p:cNvPicPr>
-            <a:picLocks noChangeAspect="1"/>
+            <a:picLocks noGrp="1" noChangeAspect="1"/>
           </p:cNvPicPr>
-          <p:nvPr/>
+          <p:nvPr>
+            <p:ph type="pic" sz="quarter" idx="34"/>
+          </p:nvPr>
         </p:nvPicPr>
         <p:blipFill>
-          <a:blip r:embed="rId4">
+          <a:blip r:embed="rId4" cstate="screen">
             <a:extLst>
               <a:ext uri="{28A0092B-C50C-407E-A947-70E740481C1C}">
                 <a14:useLocalDpi xmlns:a14="http://schemas.microsoft.com/office/drawing/2010/main"/>
@@ -47296,29 +46798,14 @@
             <a:fillRect/>
           </a:stretch>
         </p:blipFill>
-        <p:spPr>
-          <a:xfrm>
-            <a:off x="5788916" y="2419202"/>
-            <a:ext cx="625968" cy="625968"/>
-          </a:xfrm>
-          <a:prstGeom prst="rect">
-            <a:avLst/>
-          </a:prstGeom>
-          <a:noFill/>
-          <a:ln w="95250" cap="sq" cmpd="sng" algn="ctr">
-            <a:noFill/>
-            <a:prstDash val="solid"/>
-            <a:miter lim="800000"/>
-          </a:ln>
-          <a:effectLst/>
-        </p:spPr>
+        <p:spPr/>
       </p:pic>
       <p:sp>
         <p:nvSpPr>
-          <p:cNvPr id="7" name="Text Placeholder 6">
-            <a:extLst>
-              <a:ext uri="{FF2B5EF4-FFF2-40B4-BE49-F238E27FC236}">
-                <a16:creationId xmlns:a16="http://schemas.microsoft.com/office/drawing/2014/main" id="{40297407-CE4E-4284-879D-AEC395713625}"/>
+          <p:cNvPr id="16" name="Text Placeholder 15">
+            <a:extLst>
+              <a:ext uri="{FF2B5EF4-FFF2-40B4-BE49-F238E27FC236}">
+                <a16:creationId xmlns:a16="http://schemas.microsoft.com/office/drawing/2014/main" id="{7A432125-2B7A-42E4-8AE0-79559A0082FD}"/>
               </a:ext>
             </a:extLst>
           </p:cNvPr>
@@ -47326,7 +46813,7 @@
             <a:spLocks noGrp="1"/>
           </p:cNvSpPr>
           <p:nvPr>
-            <p:ph type="body" sz="quarter" idx="35"/>
+            <p:ph type="body" sz="quarter" idx="30"/>
           </p:nvPr>
         </p:nvSpPr>
         <p:spPr/>
@@ -47336,17 +46823,17 @@
           <a:p>
             <a:r>
               <a:rPr lang="en-US" dirty="0"/>
-              <a:t>Abstract</a:t>
-            </a:r>
-          </a:p>
-        </p:txBody>
-      </p:sp>
-      <p:sp>
-        <p:nvSpPr>
-          <p:cNvPr id="8" name="Text Placeholder 7">
-            <a:extLst>
-              <a:ext uri="{FF2B5EF4-FFF2-40B4-BE49-F238E27FC236}">
-                <a16:creationId xmlns:a16="http://schemas.microsoft.com/office/drawing/2014/main" id="{F5C3A7BE-F7FC-4942-A31A-491A8A806103}"/>
+              <a:t>$2B</a:t>
+            </a:r>
+          </a:p>
+        </p:txBody>
+      </p:sp>
+      <p:sp>
+        <p:nvSpPr>
+          <p:cNvPr id="13" name="Content Placeholder 12">
+            <a:extLst>
+              <a:ext uri="{FF2B5EF4-FFF2-40B4-BE49-F238E27FC236}">
+                <a16:creationId xmlns:a16="http://schemas.microsoft.com/office/drawing/2014/main" id="{111E1D64-13B1-45CD-A29D-474622790A38}"/>
               </a:ext>
             </a:extLst>
           </p:cNvPr>
@@ -47354,7 +46841,7 @@
             <a:spLocks noGrp="1"/>
           </p:cNvSpPr>
           <p:nvPr>
-            <p:ph type="body" sz="quarter" idx="36"/>
+            <p:ph sz="half" idx="2"/>
           </p:nvPr>
         </p:nvSpPr>
         <p:spPr/>
@@ -47364,68 +46851,33 @@
           <a:p>
             <a:r>
               <a:rPr lang="en-US" dirty="0"/>
-              <a:t>Lorem </a:t>
+              <a:t>Lorem ipsum </a:t>
             </a:r>
             <a:r>
               <a:rPr lang="en-US" noProof="1"/>
-              <a:t>ipsum dolor sit amet, consectetur adipiscing elit. </a:t>
-            </a:r>
-          </a:p>
-        </p:txBody>
-      </p:sp>
-      <p:pic>
-        <p:nvPicPr>
-          <p:cNvPr id="36" name="Picture Placeholder 17" descr="Repeat">
-            <a:extLst>
-              <a:ext uri="{FF2B5EF4-FFF2-40B4-BE49-F238E27FC236}">
-                <a16:creationId xmlns:a16="http://schemas.microsoft.com/office/drawing/2014/main" id="{BE1AEB62-723B-1141-822C-73271BB1CDB3}"/>
-              </a:ext>
-            </a:extLst>
-          </p:cNvPr>
-          <p:cNvPicPr>
-            <a:picLocks noChangeAspect="1"/>
-          </p:cNvPicPr>
-          <p:nvPr/>
-        </p:nvPicPr>
-        <p:blipFill>
-          <a:blip r:embed="rId6">
-            <a:extLst>
-              <a:ext uri="{28A0092B-C50C-407E-A947-70E740481C1C}">
-                <a14:useLocalDpi xmlns:a14="http://schemas.microsoft.com/office/drawing/2010/main"/>
-              </a:ext>
-              <a:ext uri="{96DAC541-7B7A-43D3-8B79-37D633B846F1}">
-                <asvg:svgBlip xmlns:asvg="http://schemas.microsoft.com/office/drawing/2016/SVG/main" r:embed="rId7"/>
-              </a:ext>
-            </a:extLst>
-          </a:blip>
-          <a:srcRect/>
-          <a:stretch>
-            <a:fillRect/>
-          </a:stretch>
-        </p:blipFill>
-        <p:spPr>
-          <a:xfrm>
-            <a:off x="8128966" y="2406502"/>
-            <a:ext cx="625968" cy="625968"/>
-          </a:xfrm>
-          <a:prstGeom prst="rect">
-            <a:avLst/>
-          </a:prstGeom>
-          <a:noFill/>
-          <a:ln w="95250" cap="sq" cmpd="sng" algn="ctr">
-            <a:noFill/>
-            <a:prstDash val="solid"/>
-            <a:miter lim="800000"/>
-          </a:ln>
-          <a:effectLst/>
-        </p:spPr>
-      </p:pic>
-      <p:sp>
-        <p:nvSpPr>
-          <p:cNvPr id="9" name="Text Placeholder 8">
-            <a:extLst>
-              <a:ext uri="{FF2B5EF4-FFF2-40B4-BE49-F238E27FC236}">
-                <a16:creationId xmlns:a16="http://schemas.microsoft.com/office/drawing/2014/main" id="{95CCE699-03D1-4642-B46A-B14EF17DA183}"/>
+              <a:t>dolor sit amet, consectetur adipiscing elit. </a:t>
+            </a:r>
+          </a:p>
+          <a:p>
+            <a:r>
+              <a:rPr lang="en-US" noProof="1"/>
+              <a:t>Etiam aliquet eu mi quis lacinia. Ut fermentum a magna ut eleifend. Integer convallis suscipit ante eu varius. </a:t>
+            </a:r>
+          </a:p>
+          <a:p>
+            <a:r>
+              <a:rPr lang="en-US" noProof="1"/>
+              <a:t>Morbi a purus dolor. Suspendisse sit amet ipsum finibus justo viverra blandit.</a:t>
+            </a:r>
+          </a:p>
+        </p:txBody>
+      </p:sp>
+      <p:sp>
+        <p:nvSpPr>
+          <p:cNvPr id="3" name="Footer Placeholder 2">
+            <a:extLst>
+              <a:ext uri="{FF2B5EF4-FFF2-40B4-BE49-F238E27FC236}">
+                <a16:creationId xmlns:a16="http://schemas.microsoft.com/office/drawing/2014/main" id="{E103D420-AEB0-44F9-86F5-DB2505B0F4E7}"/>
               </a:ext>
             </a:extLst>
           </p:cNvPr>
@@ -47433,7 +46885,7 @@
             <a:spLocks noGrp="1"/>
           </p:cNvSpPr>
           <p:nvPr>
-            <p:ph type="body" sz="quarter" idx="37"/>
+            <p:ph type="ftr" sz="quarter" idx="10"/>
           </p:nvPr>
         </p:nvSpPr>
         <p:spPr/>
@@ -47443,66 +46895,6 @@
           <a:p>
             <a:r>
               <a:rPr lang="en-US" dirty="0"/>
-              <a:t>Design</a:t>
-            </a:r>
-          </a:p>
-        </p:txBody>
-      </p:sp>
-      <p:sp>
-        <p:nvSpPr>
-          <p:cNvPr id="10" name="Text Placeholder 9">
-            <a:extLst>
-              <a:ext uri="{FF2B5EF4-FFF2-40B4-BE49-F238E27FC236}">
-                <a16:creationId xmlns:a16="http://schemas.microsoft.com/office/drawing/2014/main" id="{BC1DF189-6F2F-4C21-88CC-C82D3D0D147B}"/>
-              </a:ext>
-            </a:extLst>
-          </p:cNvPr>
-          <p:cNvSpPr>
-            <a:spLocks noGrp="1"/>
-          </p:cNvSpPr>
-          <p:nvPr>
-            <p:ph type="body" sz="quarter" idx="38"/>
-          </p:nvPr>
-        </p:nvSpPr>
-        <p:spPr/>
-        <p:txBody>
-          <a:bodyPr/>
-          <a:lstStyle/>
-          <a:p>
-            <a:r>
-              <a:rPr lang="en-US" dirty="0"/>
-              <a:t>Lorem </a:t>
-            </a:r>
-            <a:r>
-              <a:rPr lang="en-US" noProof="1"/>
-              <a:t>ipsum dolor sit amet, consectetur adipiscing elit. </a:t>
-            </a:r>
-          </a:p>
-        </p:txBody>
-      </p:sp>
-      <p:sp>
-        <p:nvSpPr>
-          <p:cNvPr id="3" name="Footer Placeholder 2">
-            <a:extLst>
-              <a:ext uri="{FF2B5EF4-FFF2-40B4-BE49-F238E27FC236}">
-                <a16:creationId xmlns:a16="http://schemas.microsoft.com/office/drawing/2014/main" id="{005C44B1-BA82-483C-BD91-F89067442F9E}"/>
-              </a:ext>
-            </a:extLst>
-          </p:cNvPr>
-          <p:cNvSpPr>
-            <a:spLocks noGrp="1"/>
-          </p:cNvSpPr>
-          <p:nvPr>
-            <p:ph type="ftr" sz="quarter" idx="10"/>
-          </p:nvPr>
-        </p:nvSpPr>
-        <p:spPr/>
-        <p:txBody>
-          <a:bodyPr/>
-          <a:lstStyle/>
-          <a:p>
-            <a:r>
-              <a:rPr lang="en-US" dirty="0"/>
               <a:t>Add a footer</a:t>
             </a:r>
           </a:p>
@@ -47513,7 +46905,7 @@
           <p:cNvPr id="4" name="Slide Number Placeholder 3">
             <a:extLst>
               <a:ext uri="{FF2B5EF4-FFF2-40B4-BE49-F238E27FC236}">
-                <a16:creationId xmlns:a16="http://schemas.microsoft.com/office/drawing/2014/main" id="{79ED4A67-3A46-4F54-A12A-EAE1B53E6457}"/>
+                <a16:creationId xmlns:a16="http://schemas.microsoft.com/office/drawing/2014/main" id="{A88525D2-29EF-4156-8E05-4971770BF1AF}"/>
               </a:ext>
             </a:extLst>
           </p:cNvPr>
@@ -47541,7 +46933,7 @@
     </p:spTree>
     <p:extLst>
       <p:ext uri="{BB962C8B-B14F-4D97-AF65-F5344CB8AC3E}">
-        <p14:creationId xmlns:p14="http://schemas.microsoft.com/office/powerpoint/2010/main" val="2069393026"/>
+        <p14:creationId xmlns:p14="http://schemas.microsoft.com/office/powerpoint/2010/main" val="1234443194"/>
       </p:ext>
     </p:extLst>
   </p:cSld>

</xml_diff>